<commit_message>
The banner is completed and more text and figures were added. More work is still needed.
</commit_message>
<xml_diff>
--- a/documentation/poster/poster.pptx
+++ b/documentation/poster/poster.pptx
@@ -104,6 +104,11 @@
       </a:defRPr>
     </a:lvl9pPr>
   </p:defaultTextStyle>
+  <p:extLst>
+    <p:ext uri="{EFAFB233-063F-42B5-8137-9DF3F51BA10A}">
+      <p15:sldGuideLst xmlns:p15="http://schemas.microsoft.com/office/powerpoint/2012/main"/>
+    </p:ext>
+  </p:extLst>
 </p:presentation>
 </file>
 
@@ -238,7 +243,7 @@
           <a:p>
             <a:fld id="{00A5CD91-B80E-4D93-AA1A-3B67EAF1B994}" type="datetimeFigureOut">
               <a:rPr lang="en-US" smtClean="0"/>
-              <a:t>7/13/2017</a:t>
+              <a:t>7/17/2017</a:t>
             </a:fld>
             <a:endParaRPr lang="en-US"/>
           </a:p>
@@ -408,7 +413,7 @@
           <a:p>
             <a:fld id="{00A5CD91-B80E-4D93-AA1A-3B67EAF1B994}" type="datetimeFigureOut">
               <a:rPr lang="en-US" smtClean="0"/>
-              <a:t>7/13/2017</a:t>
+              <a:t>7/17/2017</a:t>
             </a:fld>
             <a:endParaRPr lang="en-US"/>
           </a:p>
@@ -588,7 +593,7 @@
           <a:p>
             <a:fld id="{00A5CD91-B80E-4D93-AA1A-3B67EAF1B994}" type="datetimeFigureOut">
               <a:rPr lang="en-US" smtClean="0"/>
-              <a:t>7/13/2017</a:t>
+              <a:t>7/17/2017</a:t>
             </a:fld>
             <a:endParaRPr lang="en-US"/>
           </a:p>
@@ -758,7 +763,7 @@
           <a:p>
             <a:fld id="{00A5CD91-B80E-4D93-AA1A-3B67EAF1B994}" type="datetimeFigureOut">
               <a:rPr lang="en-US" smtClean="0"/>
-              <a:t>7/13/2017</a:t>
+              <a:t>7/17/2017</a:t>
             </a:fld>
             <a:endParaRPr lang="en-US"/>
           </a:p>
@@ -1002,7 +1007,7 @@
           <a:p>
             <a:fld id="{00A5CD91-B80E-4D93-AA1A-3B67EAF1B994}" type="datetimeFigureOut">
               <a:rPr lang="en-US" smtClean="0"/>
-              <a:t>7/13/2017</a:t>
+              <a:t>7/17/2017</a:t>
             </a:fld>
             <a:endParaRPr lang="en-US"/>
           </a:p>
@@ -1234,7 +1239,7 @@
           <a:p>
             <a:fld id="{00A5CD91-B80E-4D93-AA1A-3B67EAF1B994}" type="datetimeFigureOut">
               <a:rPr lang="en-US" smtClean="0"/>
-              <a:t>7/13/2017</a:t>
+              <a:t>7/17/2017</a:t>
             </a:fld>
             <a:endParaRPr lang="en-US"/>
           </a:p>
@@ -1601,7 +1606,7 @@
           <a:p>
             <a:fld id="{00A5CD91-B80E-4D93-AA1A-3B67EAF1B994}" type="datetimeFigureOut">
               <a:rPr lang="en-US" smtClean="0"/>
-              <a:t>7/13/2017</a:t>
+              <a:t>7/17/2017</a:t>
             </a:fld>
             <a:endParaRPr lang="en-US"/>
           </a:p>
@@ -1719,7 +1724,7 @@
           <a:p>
             <a:fld id="{00A5CD91-B80E-4D93-AA1A-3B67EAF1B994}" type="datetimeFigureOut">
               <a:rPr lang="en-US" smtClean="0"/>
-              <a:t>7/13/2017</a:t>
+              <a:t>7/17/2017</a:t>
             </a:fld>
             <a:endParaRPr lang="en-US"/>
           </a:p>
@@ -1814,7 +1819,7 @@
           <a:p>
             <a:fld id="{00A5CD91-B80E-4D93-AA1A-3B67EAF1B994}" type="datetimeFigureOut">
               <a:rPr lang="en-US" smtClean="0"/>
-              <a:t>7/13/2017</a:t>
+              <a:t>7/17/2017</a:t>
             </a:fld>
             <a:endParaRPr lang="en-US"/>
           </a:p>
@@ -2091,7 +2096,7 @@
           <a:p>
             <a:fld id="{00A5CD91-B80E-4D93-AA1A-3B67EAF1B994}" type="datetimeFigureOut">
               <a:rPr lang="en-US" smtClean="0"/>
-              <a:t>7/13/2017</a:t>
+              <a:t>7/17/2017</a:t>
             </a:fld>
             <a:endParaRPr lang="en-US"/>
           </a:p>
@@ -2348,7 +2353,7 @@
           <a:p>
             <a:fld id="{00A5CD91-B80E-4D93-AA1A-3B67EAF1B994}" type="datetimeFigureOut">
               <a:rPr lang="en-US" smtClean="0"/>
-              <a:t>7/13/2017</a:t>
+              <a:t>7/17/2017</a:t>
             </a:fld>
             <a:endParaRPr lang="en-US"/>
           </a:p>
@@ -2561,7 +2566,7 @@
           <a:p>
             <a:fld id="{00A5CD91-B80E-4D93-AA1A-3B67EAF1B994}" type="datetimeFigureOut">
               <a:rPr lang="en-US" smtClean="0"/>
-              <a:t>7/13/2017</a:t>
+              <a:t>7/17/2017</a:t>
             </a:fld>
             <a:endParaRPr lang="en-US"/>
           </a:p>
@@ -2966,6 +2971,47 @@
           <a:chExt cx="0" cy="0"/>
         </a:xfrm>
       </p:grpSpPr>
+      <p:pic>
+        <p:nvPicPr>
+          <p:cNvPr id="1028" name="Picture 4" descr="Related image"/>
+          <p:cNvPicPr>
+            <a:picLocks noChangeAspect="1" noChangeArrowheads="1"/>
+          </p:cNvPicPr>
+          <p:nvPr/>
+        </p:nvPicPr>
+        <p:blipFill>
+          <a:blip r:embed="rId2" cstate="print">
+            <a:extLst>
+              <a:ext uri="{28A0092B-C50C-407E-A947-70E740481C1C}">
+                <a14:useLocalDpi xmlns:a14="http://schemas.microsoft.com/office/drawing/2010/main" val="0"/>
+              </a:ext>
+            </a:extLst>
+          </a:blip>
+          <a:srcRect/>
+          <a:stretch>
+            <a:fillRect/>
+          </a:stretch>
+        </p:blipFill>
+        <p:spPr bwMode="auto">
+          <a:xfrm>
+            <a:off x="238733" y="877570"/>
+            <a:ext cx="3495568" cy="3010634"/>
+          </a:xfrm>
+          <a:prstGeom prst="rect">
+            <a:avLst/>
+          </a:prstGeom>
+          <a:noFill/>
+          <a:extLst>
+            <a:ext uri="{909E8E84-426E-40DD-AFC4-6F175D3DCCD1}">
+              <a14:hiddenFill xmlns:a14="http://schemas.microsoft.com/office/drawing/2010/main">
+                <a:solidFill>
+                  <a:srgbClr val="FFFFFF"/>
+                </a:solidFill>
+              </a14:hiddenFill>
+            </a:ext>
+          </a:extLst>
+        </p:spPr>
+      </p:pic>
       <p:sp>
         <p:nvSpPr>
           <p:cNvPr id="4" name="TextBox 3"/>
@@ -2974,8 +3020,8 @@
         </p:nvSpPr>
         <p:spPr>
           <a:xfrm>
-            <a:off x="1800225" y="1228725"/>
-            <a:ext cx="26031825" cy="2554545"/>
+            <a:off x="3734301" y="1129047"/>
+            <a:ext cx="23488650" cy="2308324"/>
           </a:xfrm>
           <a:prstGeom prst="rect">
             <a:avLst/>
@@ -2988,11 +3034,12 @@
           </a:bodyPr>
           <a:lstStyle/>
           <a:p>
-            <a:r>
-              <a:rPr lang="en-US" sz="8000" b="1" dirty="0" smtClean="0"/>
+            <a:pPr algn="ctr"/>
+            <a:r>
+              <a:rPr lang="en-US" sz="7200" b="1" dirty="0" smtClean="0"/>
               <a:t>Architecture for An Indoor Distributed Cyber-Physical System Composed of Mobile Robots and Fog Computing Nodes</a:t>
             </a:r>
-            <a:endParaRPr lang="en-US" sz="8000" b="1" dirty="0"/>
+            <a:endParaRPr lang="en-US" sz="7200" b="1" dirty="0"/>
           </a:p>
         </p:txBody>
       </p:sp>
@@ -3005,7 +3052,7 @@
         <p:spPr>
           <a:xfrm>
             <a:off x="1800225" y="4464503"/>
-            <a:ext cx="12001500" cy="1323439"/>
+            <a:ext cx="8896469" cy="3905940"/>
           </a:xfrm>
           <a:prstGeom prst="rect">
             <a:avLst/>
@@ -3034,7 +3081,23 @@
                   <a:schemeClr val="tx2"/>
                 </a:solidFill>
               </a:rPr>
-              <a:t>STUFFFFFFFF</a:t>
+              <a:t>To develop an architecture for providing localization information to robots using StarL across the view of multiple Kinect cameras connected to x86 </a:t>
+            </a:r>
+            <a:r>
+              <a:rPr lang="en-US" sz="4000" dirty="0" err="1" smtClean="0">
+                <a:solidFill>
+                  <a:schemeClr val="tx2"/>
+                </a:solidFill>
+              </a:rPr>
+              <a:t>MinnowBoards</a:t>
+            </a:r>
+            <a:r>
+              <a:rPr lang="en-US" sz="4000" dirty="0" smtClean="0">
+                <a:solidFill>
+                  <a:schemeClr val="tx2"/>
+                </a:solidFill>
+              </a:rPr>
+              <a:t> in a Fog Computing fashion.</a:t>
             </a:r>
             <a:endParaRPr lang="en-US" sz="4000" dirty="0"/>
           </a:p>
@@ -3048,8 +3111,8 @@
         </p:nvSpPr>
         <p:spPr>
           <a:xfrm>
-            <a:off x="21278850" y="17365228"/>
-            <a:ext cx="7439025" cy="1323439"/>
+            <a:off x="20292142" y="16903338"/>
+            <a:ext cx="8425733" cy="1323439"/>
           </a:xfrm>
           <a:prstGeom prst="rect">
             <a:avLst/>
@@ -3092,8 +3155,8 @@
         </p:nvSpPr>
         <p:spPr>
           <a:xfrm>
-            <a:off x="1800225" y="11305879"/>
-            <a:ext cx="12001500" cy="1323439"/>
+            <a:off x="1631783" y="18943845"/>
+            <a:ext cx="8896469" cy="1323439"/>
           </a:xfrm>
           <a:prstGeom prst="rect">
             <a:avLst/>
@@ -3136,8 +3199,8 @@
         </p:nvSpPr>
         <p:spPr>
           <a:xfrm>
-            <a:off x="21278850" y="4464502"/>
-            <a:ext cx="7439025" cy="1323439"/>
+            <a:off x="20292142" y="4464502"/>
+            <a:ext cx="8425733" cy="1323439"/>
           </a:xfrm>
           <a:prstGeom prst="rect">
             <a:avLst/>
@@ -3166,22 +3229,52 @@
                   <a:schemeClr val="tx2"/>
                 </a:solidFill>
               </a:rPr>
-              <a:t>STUFFFFFFFF</a:t>
+              <a:t>STUFFFFFFFFFFFFFFFFFFFFFFFFFFFFFFF</a:t>
             </a:r>
             <a:endParaRPr lang="en-US" sz="4000" dirty="0"/>
           </a:p>
         </p:txBody>
       </p:sp>
-      <p:sp>
-        <p:nvSpPr>
-          <p:cNvPr id="9" name="TextBox 8"/>
+      <p:pic>
+        <p:nvPicPr>
+          <p:cNvPr id="2" name="Picture 1"/>
+          <p:cNvPicPr>
+            <a:picLocks noChangeAspect="1"/>
+          </p:cNvPicPr>
+          <p:nvPr/>
+        </p:nvPicPr>
+        <p:blipFill>
+          <a:blip r:embed="rId3" cstate="print">
+            <a:extLst>
+              <a:ext uri="{28A0092B-C50C-407E-A947-70E740481C1C}">
+                <a14:useLocalDpi xmlns:a14="http://schemas.microsoft.com/office/drawing/2010/main" val="0"/>
+              </a:ext>
+            </a:extLst>
+          </a:blip>
+          <a:stretch>
+            <a:fillRect/>
+          </a:stretch>
+        </p:blipFill>
+        <p:spPr>
+          <a:xfrm>
+            <a:off x="27089100" y="275957"/>
+            <a:ext cx="3483864" cy="4213860"/>
+          </a:xfrm>
+          <a:prstGeom prst="rect">
+            <a:avLst/>
+          </a:prstGeom>
+        </p:spPr>
+      </p:pic>
+      <p:sp>
+        <p:nvSpPr>
+          <p:cNvPr id="11" name="TextBox 10"/>
           <p:cNvSpPr txBox="1"/>
           <p:nvPr/>
         </p:nvSpPr>
         <p:spPr>
           <a:xfrm>
-            <a:off x="1800225" y="3645517"/>
-            <a:ext cx="32816346" cy="615553"/>
+            <a:off x="1631783" y="13183227"/>
+            <a:ext cx="9064911" cy="5632311"/>
           </a:xfrm>
           <a:prstGeom prst="rect">
             <a:avLst/>
@@ -3195,6 +3288,63 @@
           <a:lstStyle/>
           <a:p>
             <a:r>
+              <a:rPr lang="en-US" sz="4000" b="1" dirty="0" smtClean="0">
+                <a:solidFill>
+                  <a:schemeClr val="tx2"/>
+                </a:solidFill>
+              </a:rPr>
+              <a:t>Motivation</a:t>
+            </a:r>
+            <a:endParaRPr lang="en-US" sz="4000" b="1" dirty="0" smtClean="0">
+              <a:solidFill>
+                <a:schemeClr val="tx2"/>
+              </a:solidFill>
+            </a:endParaRPr>
+          </a:p>
+          <a:p>
+            <a:r>
+              <a:rPr lang="en-US" sz="4000" dirty="0" smtClean="0">
+                <a:solidFill>
+                  <a:schemeClr val="tx2"/>
+                </a:solidFill>
+              </a:rPr>
+              <a:t>The current system uses a single Kinect camera which limits the total field of view. By adding more Kinect cameras, the area </a:t>
+            </a:r>
+            <a:r>
+              <a:rPr lang="en-US" sz="4000" dirty="0" smtClean="0">
+                <a:solidFill>
+                  <a:schemeClr val="tx2"/>
+                </a:solidFill>
+              </a:rPr>
+              <a:t>covered by the localization method is expanded so more tests can be run across a larger area. Additionally, the architecture could be used for other, similar distributed systems.</a:t>
+            </a:r>
+            <a:endParaRPr lang="en-US" sz="4000" dirty="0"/>
+          </a:p>
+        </p:txBody>
+      </p:sp>
+      <p:sp>
+        <p:nvSpPr>
+          <p:cNvPr id="9" name="TextBox 8"/>
+          <p:cNvSpPr txBox="1"/>
+          <p:nvPr/>
+        </p:nvSpPr>
+        <p:spPr>
+          <a:xfrm>
+            <a:off x="1631783" y="3791904"/>
+            <a:ext cx="27556828" cy="615553"/>
+          </a:xfrm>
+          <a:prstGeom prst="rect">
+            <a:avLst/>
+          </a:prstGeom>
+          <a:noFill/>
+        </p:spPr>
+        <p:txBody>
+          <a:bodyPr wrap="square" rtlCol="0">
+            <a:spAutoFit/>
+          </a:bodyPr>
+          <a:lstStyle/>
+          <a:p>
+            <a:r>
               <a:rPr lang="en-US" sz="3400" dirty="0" smtClean="0"/>
               <a:t>Nathaniel Paul Hamilton ● PhD Student at Vanderbilt University, Electrical Engineering ● nathaniel.p.hamilton@Vanderbilt.edu ● Advisor: Dr. Taylor Johnson</a:t>
             </a:r>
@@ -3202,6 +3352,96 @@
           </a:p>
         </p:txBody>
       </p:sp>
+      <p:pic>
+        <p:nvPicPr>
+          <p:cNvPr id="12" name="Picture 11"/>
+          <p:cNvPicPr>
+            <a:picLocks noChangeAspect="1"/>
+          </p:cNvPicPr>
+          <p:nvPr/>
+        </p:nvPicPr>
+        <p:blipFill>
+          <a:blip r:embed="rId4">
+            <a:extLst>
+              <a:ext uri="{28A0092B-C50C-407E-A947-70E740481C1C}">
+                <a14:useLocalDpi xmlns:a14="http://schemas.microsoft.com/office/drawing/2010/main" val="0"/>
+              </a:ext>
+            </a:extLst>
+          </a:blip>
+          <a:stretch>
+            <a:fillRect/>
+          </a:stretch>
+        </p:blipFill>
+        <p:spPr>
+          <a:xfrm>
+            <a:off x="10961962" y="5301459"/>
+            <a:ext cx="8896469" cy="4388227"/>
+          </a:xfrm>
+          <a:prstGeom prst="rect">
+            <a:avLst/>
+          </a:prstGeom>
+        </p:spPr>
+      </p:pic>
+      <p:pic>
+        <p:nvPicPr>
+          <p:cNvPr id="13" name="Picture 12"/>
+          <p:cNvPicPr>
+            <a:picLocks noChangeAspect="1"/>
+          </p:cNvPicPr>
+          <p:nvPr/>
+        </p:nvPicPr>
+        <p:blipFill>
+          <a:blip r:embed="rId5">
+            <a:extLst>
+              <a:ext uri="{28A0092B-C50C-407E-A947-70E740481C1C}">
+                <a14:useLocalDpi xmlns:a14="http://schemas.microsoft.com/office/drawing/2010/main" val="0"/>
+              </a:ext>
+            </a:extLst>
+          </a:blip>
+          <a:stretch>
+            <a:fillRect/>
+          </a:stretch>
+        </p:blipFill>
+        <p:spPr>
+          <a:xfrm>
+            <a:off x="10696694" y="12213141"/>
+            <a:ext cx="8681680" cy="7764528"/>
+          </a:xfrm>
+          <a:prstGeom prst="rect">
+            <a:avLst/>
+          </a:prstGeom>
+        </p:spPr>
+      </p:pic>
+      <p:pic>
+        <p:nvPicPr>
+          <p:cNvPr id="14" name="Picture 13"/>
+          <p:cNvPicPr>
+            <a:picLocks noChangeAspect="1"/>
+          </p:cNvPicPr>
+          <p:nvPr/>
+        </p:nvPicPr>
+        <p:blipFill>
+          <a:blip r:embed="rId6">
+            <a:extLst>
+              <a:ext uri="{28A0092B-C50C-407E-A947-70E740481C1C}">
+                <a14:useLocalDpi xmlns:a14="http://schemas.microsoft.com/office/drawing/2010/main" val="0"/>
+              </a:ext>
+            </a:extLst>
+          </a:blip>
+          <a:stretch>
+            <a:fillRect/>
+          </a:stretch>
+        </p:blipFill>
+        <p:spPr>
+          <a:xfrm>
+            <a:off x="1631783" y="8250155"/>
+            <a:ext cx="9064911" cy="4961482"/>
+          </a:xfrm>
+          <a:prstGeom prst="rect">
+            <a:avLst/>
+          </a:prstGeom>
+        </p:spPr>
+      </p:pic>
     </p:spTree>
     <p:extLst>
       <p:ext uri="{BB962C8B-B14F-4D97-AF65-F5344CB8AC3E}">

</xml_diff>

<commit_message>
added more to the approach section of the poster
</commit_message>
<xml_diff>
--- a/documentation/poster/poster.pptx
+++ b/documentation/poster/poster.pptx
@@ -243,7 +243,7 @@
           <a:p>
             <a:fld id="{00A5CD91-B80E-4D93-AA1A-3B67EAF1B994}" type="datetimeFigureOut">
               <a:rPr lang="en-US" smtClean="0"/>
-              <a:t>7/17/2017</a:t>
+              <a:t>7/18/2017</a:t>
             </a:fld>
             <a:endParaRPr lang="en-US"/>
           </a:p>
@@ -413,7 +413,7 @@
           <a:p>
             <a:fld id="{00A5CD91-B80E-4D93-AA1A-3B67EAF1B994}" type="datetimeFigureOut">
               <a:rPr lang="en-US" smtClean="0"/>
-              <a:t>7/17/2017</a:t>
+              <a:t>7/18/2017</a:t>
             </a:fld>
             <a:endParaRPr lang="en-US"/>
           </a:p>
@@ -593,7 +593,7 @@
           <a:p>
             <a:fld id="{00A5CD91-B80E-4D93-AA1A-3B67EAF1B994}" type="datetimeFigureOut">
               <a:rPr lang="en-US" smtClean="0"/>
-              <a:t>7/17/2017</a:t>
+              <a:t>7/18/2017</a:t>
             </a:fld>
             <a:endParaRPr lang="en-US"/>
           </a:p>
@@ -763,7 +763,7 @@
           <a:p>
             <a:fld id="{00A5CD91-B80E-4D93-AA1A-3B67EAF1B994}" type="datetimeFigureOut">
               <a:rPr lang="en-US" smtClean="0"/>
-              <a:t>7/17/2017</a:t>
+              <a:t>7/18/2017</a:t>
             </a:fld>
             <a:endParaRPr lang="en-US"/>
           </a:p>
@@ -1007,7 +1007,7 @@
           <a:p>
             <a:fld id="{00A5CD91-B80E-4D93-AA1A-3B67EAF1B994}" type="datetimeFigureOut">
               <a:rPr lang="en-US" smtClean="0"/>
-              <a:t>7/17/2017</a:t>
+              <a:t>7/18/2017</a:t>
             </a:fld>
             <a:endParaRPr lang="en-US"/>
           </a:p>
@@ -1239,7 +1239,7 @@
           <a:p>
             <a:fld id="{00A5CD91-B80E-4D93-AA1A-3B67EAF1B994}" type="datetimeFigureOut">
               <a:rPr lang="en-US" smtClean="0"/>
-              <a:t>7/17/2017</a:t>
+              <a:t>7/18/2017</a:t>
             </a:fld>
             <a:endParaRPr lang="en-US"/>
           </a:p>
@@ -1606,7 +1606,7 @@
           <a:p>
             <a:fld id="{00A5CD91-B80E-4D93-AA1A-3B67EAF1B994}" type="datetimeFigureOut">
               <a:rPr lang="en-US" smtClean="0"/>
-              <a:t>7/17/2017</a:t>
+              <a:t>7/18/2017</a:t>
             </a:fld>
             <a:endParaRPr lang="en-US"/>
           </a:p>
@@ -1724,7 +1724,7 @@
           <a:p>
             <a:fld id="{00A5CD91-B80E-4D93-AA1A-3B67EAF1B994}" type="datetimeFigureOut">
               <a:rPr lang="en-US" smtClean="0"/>
-              <a:t>7/17/2017</a:t>
+              <a:t>7/18/2017</a:t>
             </a:fld>
             <a:endParaRPr lang="en-US"/>
           </a:p>
@@ -1819,7 +1819,7 @@
           <a:p>
             <a:fld id="{00A5CD91-B80E-4D93-AA1A-3B67EAF1B994}" type="datetimeFigureOut">
               <a:rPr lang="en-US" smtClean="0"/>
-              <a:t>7/17/2017</a:t>
+              <a:t>7/18/2017</a:t>
             </a:fld>
             <a:endParaRPr lang="en-US"/>
           </a:p>
@@ -2096,7 +2096,7 @@
           <a:p>
             <a:fld id="{00A5CD91-B80E-4D93-AA1A-3B67EAF1B994}" type="datetimeFigureOut">
               <a:rPr lang="en-US" smtClean="0"/>
-              <a:t>7/17/2017</a:t>
+              <a:t>7/18/2017</a:t>
             </a:fld>
             <a:endParaRPr lang="en-US"/>
           </a:p>
@@ -2353,7 +2353,7 @@
           <a:p>
             <a:fld id="{00A5CD91-B80E-4D93-AA1A-3B67EAF1B994}" type="datetimeFigureOut">
               <a:rPr lang="en-US" smtClean="0"/>
-              <a:t>7/17/2017</a:t>
+              <a:t>7/18/2017</a:t>
             </a:fld>
             <a:endParaRPr lang="en-US"/>
           </a:p>
@@ -2566,7 +2566,7 @@
           <a:p>
             <a:fld id="{00A5CD91-B80E-4D93-AA1A-3B67EAF1B994}" type="datetimeFigureOut">
               <a:rPr lang="en-US" smtClean="0"/>
-              <a:t>7/17/2017</a:t>
+              <a:t>7/18/2017</a:t>
             </a:fld>
             <a:endParaRPr lang="en-US"/>
           </a:p>
@@ -3052,7 +3052,7 @@
         <p:spPr>
           <a:xfrm>
             <a:off x="1800225" y="4464503"/>
-            <a:ext cx="8896469" cy="3905940"/>
+            <a:ext cx="8896469" cy="3477875"/>
           </a:xfrm>
           <a:prstGeom prst="rect">
             <a:avLst/>
@@ -3076,7 +3076,7 @@
           </a:p>
           <a:p>
             <a:r>
-              <a:rPr lang="en-US" sz="4000" dirty="0" smtClean="0">
+              <a:rPr lang="en-US" sz="3600" dirty="0" smtClean="0">
                 <a:solidFill>
                   <a:schemeClr val="tx2"/>
                 </a:solidFill>
@@ -3084,7 +3084,7 @@
               <a:t>To develop an architecture for providing localization information to robots using StarL across the view of multiple Kinect cameras connected to x86 </a:t>
             </a:r>
             <a:r>
-              <a:rPr lang="en-US" sz="4000" dirty="0" err="1" smtClean="0">
+              <a:rPr lang="en-US" sz="3600" dirty="0" err="1" smtClean="0">
                 <a:solidFill>
                   <a:schemeClr val="tx2"/>
                 </a:solidFill>
@@ -3092,14 +3092,18 @@
               <a:t>MinnowBoards</a:t>
             </a:r>
             <a:r>
-              <a:rPr lang="en-US" sz="4000" dirty="0" smtClean="0">
+              <a:rPr lang="en-US" sz="3600" dirty="0" smtClean="0">
                 <a:solidFill>
                   <a:schemeClr val="tx2"/>
                 </a:solidFill>
               </a:rPr>
               <a:t> in a Fog Computing fashion.</a:t>
             </a:r>
-            <a:endParaRPr lang="en-US" sz="4000" dirty="0"/>
+            <a:endParaRPr lang="en-US" sz="3600" dirty="0">
+              <a:solidFill>
+                <a:schemeClr val="tx2"/>
+              </a:solidFill>
+            </a:endParaRPr>
           </a:p>
         </p:txBody>
       </p:sp>
@@ -3112,7 +3116,7 @@
         <p:spPr>
           <a:xfrm>
             <a:off x="20292142" y="16903338"/>
-            <a:ext cx="8425733" cy="1323439"/>
+            <a:ext cx="8425733" cy="1261884"/>
           </a:xfrm>
           <a:prstGeom prst="rect">
             <a:avLst/>
@@ -3136,14 +3140,14 @@
           </a:p>
           <a:p>
             <a:r>
-              <a:rPr lang="en-US" sz="4000" dirty="0" smtClean="0">
+              <a:rPr lang="en-US" sz="3600" dirty="0" smtClean="0">
                 <a:solidFill>
                   <a:schemeClr val="tx2"/>
                 </a:solidFill>
               </a:rPr>
               <a:t>STUFFFFFFFF</a:t>
             </a:r>
-            <a:endParaRPr lang="en-US" sz="4000" dirty="0"/>
+            <a:endParaRPr lang="en-US" sz="3600" dirty="0"/>
           </a:p>
         </p:txBody>
       </p:sp>
@@ -3155,8 +3159,8 @@
         </p:nvSpPr>
         <p:spPr>
           <a:xfrm>
-            <a:off x="1631783" y="18943845"/>
-            <a:ext cx="8896469" cy="1323439"/>
+            <a:off x="1631783" y="17863099"/>
+            <a:ext cx="8896469" cy="4585871"/>
           </a:xfrm>
           <a:prstGeom prst="rect">
             <a:avLst/>
@@ -3180,14 +3184,14 @@
           </a:p>
           <a:p>
             <a:r>
-              <a:rPr lang="en-US" sz="4000" dirty="0" smtClean="0">
+              <a:rPr lang="en-US" sz="3600" dirty="0" smtClean="0">
                 <a:solidFill>
                   <a:schemeClr val="tx2"/>
                 </a:solidFill>
               </a:rPr>
-              <a:t>STUFFFFFFFF</a:t>
-            </a:r>
-            <a:endParaRPr lang="en-US" sz="4000" dirty="0"/>
+              <a:t>The system was designed to run on ROS as two types of nodes. One node to act as a “Central Command” and the other to compute the localization information at each Kinect. The “Central Command” records position information and informs each Kinect node which drones it should be seeing.</a:t>
+            </a:r>
+            <a:endParaRPr lang="en-US" sz="3600" dirty="0"/>
           </a:p>
         </p:txBody>
       </p:sp>
@@ -3200,7 +3204,7 @@
         <p:spPr>
           <a:xfrm>
             <a:off x="20292142" y="4464502"/>
-            <a:ext cx="8425733" cy="1323439"/>
+            <a:ext cx="8425733" cy="1261884"/>
           </a:xfrm>
           <a:prstGeom prst="rect">
             <a:avLst/>
@@ -3224,14 +3228,14 @@
           </a:p>
           <a:p>
             <a:r>
-              <a:rPr lang="en-US" sz="4000" dirty="0" smtClean="0">
+              <a:rPr lang="en-US" sz="3600" dirty="0" smtClean="0">
                 <a:solidFill>
                   <a:schemeClr val="tx2"/>
                 </a:solidFill>
               </a:rPr>
               <a:t>STUFFFFFFFFFFFFFFFFFFFFFFFFFFFFFFF</a:t>
             </a:r>
-            <a:endParaRPr lang="en-US" sz="4000" dirty="0"/>
+            <a:endParaRPr lang="en-US" sz="3600" dirty="0"/>
           </a:p>
         </p:txBody>
       </p:sp>
@@ -3273,8 +3277,8 @@
         </p:nvSpPr>
         <p:spPr>
           <a:xfrm>
-            <a:off x="1631783" y="13183227"/>
-            <a:ext cx="9064911" cy="5632311"/>
+            <a:off x="1631783" y="12901617"/>
+            <a:ext cx="9064911" cy="4585871"/>
           </a:xfrm>
           <a:prstGeom prst="rect">
             <a:avLst/>
@@ -3295,30 +3299,17 @@
               </a:rPr>
               <a:t>Motivation</a:t>
             </a:r>
-            <a:endParaRPr lang="en-US" sz="4000" b="1" dirty="0" smtClean="0">
-              <a:solidFill>
-                <a:schemeClr val="tx2"/>
-              </a:solidFill>
-            </a:endParaRPr>
-          </a:p>
-          <a:p>
-            <a:r>
-              <a:rPr lang="en-US" sz="4000" dirty="0" smtClean="0">
+          </a:p>
+          <a:p>
+            <a:r>
+              <a:rPr lang="en-US" sz="3600" dirty="0" smtClean="0">
                 <a:solidFill>
                   <a:schemeClr val="tx2"/>
                 </a:solidFill>
               </a:rPr>
-              <a:t>The current system uses a single Kinect camera which limits the total field of view. By adding more Kinect cameras, the area </a:t>
-            </a:r>
-            <a:r>
-              <a:rPr lang="en-US" sz="4000" dirty="0" smtClean="0">
-                <a:solidFill>
-                  <a:schemeClr val="tx2"/>
-                </a:solidFill>
-              </a:rPr>
-              <a:t>covered by the localization method is expanded so more tests can be run across a larger area. Additionally, the architecture could be used for other, similar distributed systems.</a:t>
-            </a:r>
-            <a:endParaRPr lang="en-US" sz="4000" dirty="0"/>
+              <a:t>The current system uses a single Kinect camera which limits the total field of view. By adding more Kinect cameras, the area covered by the localization method is expanded so more tests can be run across a larger area. Additionally, the architecture could be used for other, similar distributed systems.</a:t>
+            </a:r>
+            <a:endParaRPr lang="en-US" sz="3600" dirty="0"/>
           </a:p>
         </p:txBody>
       </p:sp>
@@ -3404,7 +3395,7 @@
         </p:blipFill>
         <p:spPr>
           <a:xfrm>
-            <a:off x="10696694" y="12213141"/>
+            <a:off x="11389025" y="10583688"/>
             <a:ext cx="8681680" cy="7764528"/>
           </a:xfrm>
           <a:prstGeom prst="rect">
@@ -3434,7 +3425,7 @@
         </p:blipFill>
         <p:spPr>
           <a:xfrm>
-            <a:off x="1631783" y="8250155"/>
+            <a:off x="1631783" y="7999424"/>
             <a:ext cx="9064911" cy="4961482"/>
           </a:xfrm>
           <a:prstGeom prst="rect">

</xml_diff>

<commit_message>
more changes added to the poster and the mmPerPixel function has been added with measurements for minidrone, ARDrone, and Phantom4
</commit_message>
<xml_diff>
--- a/documentation/poster/poster.pptx
+++ b/documentation/poster/poster.pptx
@@ -243,7 +243,7 @@
           <a:p>
             <a:fld id="{00A5CD91-B80E-4D93-AA1A-3B67EAF1B994}" type="datetimeFigureOut">
               <a:rPr lang="en-US" smtClean="0"/>
-              <a:t>7/18/2017</a:t>
+              <a:t>7/20/2017</a:t>
             </a:fld>
             <a:endParaRPr lang="en-US"/>
           </a:p>
@@ -413,7 +413,7 @@
           <a:p>
             <a:fld id="{00A5CD91-B80E-4D93-AA1A-3B67EAF1B994}" type="datetimeFigureOut">
               <a:rPr lang="en-US" smtClean="0"/>
-              <a:t>7/18/2017</a:t>
+              <a:t>7/20/2017</a:t>
             </a:fld>
             <a:endParaRPr lang="en-US"/>
           </a:p>
@@ -593,7 +593,7 @@
           <a:p>
             <a:fld id="{00A5CD91-B80E-4D93-AA1A-3B67EAF1B994}" type="datetimeFigureOut">
               <a:rPr lang="en-US" smtClean="0"/>
-              <a:t>7/18/2017</a:t>
+              <a:t>7/20/2017</a:t>
             </a:fld>
             <a:endParaRPr lang="en-US"/>
           </a:p>
@@ -763,7 +763,7 @@
           <a:p>
             <a:fld id="{00A5CD91-B80E-4D93-AA1A-3B67EAF1B994}" type="datetimeFigureOut">
               <a:rPr lang="en-US" smtClean="0"/>
-              <a:t>7/18/2017</a:t>
+              <a:t>7/20/2017</a:t>
             </a:fld>
             <a:endParaRPr lang="en-US"/>
           </a:p>
@@ -1007,7 +1007,7 @@
           <a:p>
             <a:fld id="{00A5CD91-B80E-4D93-AA1A-3B67EAF1B994}" type="datetimeFigureOut">
               <a:rPr lang="en-US" smtClean="0"/>
-              <a:t>7/18/2017</a:t>
+              <a:t>7/20/2017</a:t>
             </a:fld>
             <a:endParaRPr lang="en-US"/>
           </a:p>
@@ -1239,7 +1239,7 @@
           <a:p>
             <a:fld id="{00A5CD91-B80E-4D93-AA1A-3B67EAF1B994}" type="datetimeFigureOut">
               <a:rPr lang="en-US" smtClean="0"/>
-              <a:t>7/18/2017</a:t>
+              <a:t>7/20/2017</a:t>
             </a:fld>
             <a:endParaRPr lang="en-US"/>
           </a:p>
@@ -1606,7 +1606,7 @@
           <a:p>
             <a:fld id="{00A5CD91-B80E-4D93-AA1A-3B67EAF1B994}" type="datetimeFigureOut">
               <a:rPr lang="en-US" smtClean="0"/>
-              <a:t>7/18/2017</a:t>
+              <a:t>7/20/2017</a:t>
             </a:fld>
             <a:endParaRPr lang="en-US"/>
           </a:p>
@@ -1724,7 +1724,7 @@
           <a:p>
             <a:fld id="{00A5CD91-B80E-4D93-AA1A-3B67EAF1B994}" type="datetimeFigureOut">
               <a:rPr lang="en-US" smtClean="0"/>
-              <a:t>7/18/2017</a:t>
+              <a:t>7/20/2017</a:t>
             </a:fld>
             <a:endParaRPr lang="en-US"/>
           </a:p>
@@ -1819,7 +1819,7 @@
           <a:p>
             <a:fld id="{00A5CD91-B80E-4D93-AA1A-3B67EAF1B994}" type="datetimeFigureOut">
               <a:rPr lang="en-US" smtClean="0"/>
-              <a:t>7/18/2017</a:t>
+              <a:t>7/20/2017</a:t>
             </a:fld>
             <a:endParaRPr lang="en-US"/>
           </a:p>
@@ -2096,7 +2096,7 @@
           <a:p>
             <a:fld id="{00A5CD91-B80E-4D93-AA1A-3B67EAF1B994}" type="datetimeFigureOut">
               <a:rPr lang="en-US" smtClean="0"/>
-              <a:t>7/18/2017</a:t>
+              <a:t>7/20/2017</a:t>
             </a:fld>
             <a:endParaRPr lang="en-US"/>
           </a:p>
@@ -2353,7 +2353,7 @@
           <a:p>
             <a:fld id="{00A5CD91-B80E-4D93-AA1A-3B67EAF1B994}" type="datetimeFigureOut">
               <a:rPr lang="en-US" smtClean="0"/>
-              <a:t>7/18/2017</a:t>
+              <a:t>7/20/2017</a:t>
             </a:fld>
             <a:endParaRPr lang="en-US"/>
           </a:p>
@@ -2566,7 +2566,7 @@
           <a:p>
             <a:fld id="{00A5CD91-B80E-4D93-AA1A-3B67EAF1B994}" type="datetimeFigureOut">
               <a:rPr lang="en-US" smtClean="0"/>
-              <a:t>7/18/2017</a:t>
+              <a:t>7/20/2017</a:t>
             </a:fld>
             <a:endParaRPr lang="en-US"/>
           </a:p>
@@ -3051,8 +3051,8 @@
         </p:nvSpPr>
         <p:spPr>
           <a:xfrm>
-            <a:off x="1800225" y="4464503"/>
-            <a:ext cx="8896469" cy="3477875"/>
+            <a:off x="1631782" y="4496619"/>
+            <a:ext cx="9064912" cy="3477875"/>
           </a:xfrm>
           <a:prstGeom prst="rect">
             <a:avLst/>
@@ -3076,34 +3076,30 @@
           </a:p>
           <a:p>
             <a:r>
-              <a:rPr lang="en-US" sz="3600" dirty="0" smtClean="0">
-                <a:solidFill>
-                  <a:schemeClr val="tx2"/>
-                </a:solidFill>
-              </a:rPr>
-              <a:t>To develop an architecture for providing localization information to robots using StarL across the view of multiple Kinect cameras connected to x86 </a:t>
-            </a:r>
-            <a:r>
-              <a:rPr lang="en-US" sz="3600" dirty="0" err="1" smtClean="0">
-                <a:solidFill>
-                  <a:schemeClr val="tx2"/>
-                </a:solidFill>
-              </a:rPr>
+              <a:rPr lang="en-US" sz="3600" dirty="0"/>
+              <a:t>D</a:t>
+            </a:r>
+            <a:r>
+              <a:rPr lang="en-US" sz="3600" dirty="0" smtClean="0"/>
+              <a:t>evelop </a:t>
+            </a:r>
+            <a:r>
+              <a:rPr lang="en-US" sz="3600" dirty="0" smtClean="0"/>
+              <a:t>an architecture for providing localization information to robots using StarL across the view of multiple Kinect cameras connected to x86 </a:t>
+            </a:r>
+            <a:r>
+              <a:rPr lang="en-US" sz="3600" dirty="0" err="1" smtClean="0"/>
               <a:t>MinnowBoards</a:t>
             </a:r>
             <a:r>
-              <a:rPr lang="en-US" sz="3600" dirty="0" smtClean="0">
-                <a:solidFill>
-                  <a:schemeClr val="tx2"/>
-                </a:solidFill>
-              </a:rPr>
-              <a:t> in a Fog Computing fashion.</a:t>
-            </a:r>
-            <a:endParaRPr lang="en-US" sz="3600" dirty="0">
-              <a:solidFill>
-                <a:schemeClr val="tx2"/>
-              </a:solidFill>
-            </a:endParaRPr>
+              <a:rPr lang="en-US" sz="3600" dirty="0" smtClean="0"/>
+              <a:t> in a Fog Computing </a:t>
+            </a:r>
+            <a:r>
+              <a:rPr lang="en-US" sz="3600" dirty="0" smtClean="0"/>
+              <a:t>fashion</a:t>
+            </a:r>
+            <a:endParaRPr lang="en-US" sz="3600" dirty="0"/>
           </a:p>
         </p:txBody>
       </p:sp>
@@ -3115,8 +3111,8 @@
         </p:nvSpPr>
         <p:spPr>
           <a:xfrm>
-            <a:off x="20292142" y="16903338"/>
-            <a:ext cx="8425733" cy="1261884"/>
+            <a:off x="20292140" y="19160763"/>
+            <a:ext cx="8425733" cy="1815882"/>
           </a:xfrm>
           <a:prstGeom prst="rect">
             <a:avLst/>
@@ -3140,13 +3136,11 @@
           </a:p>
           <a:p>
             <a:r>
-              <a:rPr lang="en-US" sz="3600" dirty="0" smtClean="0">
-                <a:solidFill>
-                  <a:schemeClr val="tx2"/>
-                </a:solidFill>
-              </a:rPr>
-              <a:t>STUFFFFFFFF</a:t>
-            </a:r>
+              <a:rPr lang="en-US" sz="3600" dirty="0" smtClean="0"/>
+              <a:t>Nathan’s Thesis</a:t>
+            </a:r>
+          </a:p>
+          <a:p>
             <a:endParaRPr lang="en-US" sz="3600" dirty="0"/>
           </a:p>
         </p:txBody>
@@ -3159,8 +3153,8 @@
         </p:nvSpPr>
         <p:spPr>
           <a:xfrm>
-            <a:off x="1631783" y="17863099"/>
-            <a:ext cx="8896469" cy="4585871"/>
+            <a:off x="11176751" y="4660328"/>
+            <a:ext cx="8896469" cy="5139869"/>
           </a:xfrm>
           <a:prstGeom prst="rect">
             <a:avLst/>
@@ -3183,13 +3177,41 @@
             </a:r>
           </a:p>
           <a:p>
-            <a:r>
-              <a:rPr lang="en-US" sz="3600" dirty="0" smtClean="0">
-                <a:solidFill>
-                  <a:schemeClr val="tx2"/>
-                </a:solidFill>
-              </a:rPr>
-              <a:t>The system was designed to run on ROS as two types of nodes. One node to act as a “Central Command” and the other to compute the localization information at each Kinect. The “Central Command” records position information and informs each Kinect node which drones it should be seeing.</a:t>
+            <a:pPr marL="571500" indent="-571500">
+              <a:buFont typeface="Arial" panose="020B0604020202020204" pitchFamily="34" charset="0"/>
+              <a:buChar char="•"/>
+            </a:pPr>
+            <a:r>
+              <a:rPr lang="en-US" sz="3600" dirty="0" smtClean="0"/>
+              <a:t>2 types of ROS nodes: Central Command, and Robot Observer</a:t>
+            </a:r>
+          </a:p>
+          <a:p>
+            <a:pPr marL="571500" indent="-571500">
+              <a:buFont typeface="Arial" panose="020B0604020202020204" pitchFamily="34" charset="0"/>
+              <a:buChar char="•"/>
+            </a:pPr>
+            <a:r>
+              <a:rPr lang="en-US" sz="3600" dirty="0" smtClean="0"/>
+              <a:t>Central Command records position information and informs each </a:t>
+            </a:r>
+            <a:r>
+              <a:rPr lang="en-US" sz="3600" dirty="0" smtClean="0"/>
+              <a:t>Robot Observer </a:t>
+            </a:r>
+            <a:r>
+              <a:rPr lang="en-US" sz="3600" dirty="0" smtClean="0"/>
+              <a:t>node which drones to look for</a:t>
+            </a:r>
+          </a:p>
+          <a:p>
+            <a:pPr marL="571500" indent="-571500">
+              <a:buFont typeface="Arial" panose="020B0604020202020204" pitchFamily="34" charset="0"/>
+              <a:buChar char="•"/>
+            </a:pPr>
+            <a:r>
+              <a:rPr lang="en-US" sz="3600" dirty="0" smtClean="0"/>
+              <a:t>Robot Observer nodes process the Kinect image and report location information to the Central Command node</a:t>
             </a:r>
             <a:endParaRPr lang="en-US" sz="3600" dirty="0"/>
           </a:p>
@@ -3204,7 +3226,7 @@
         <p:spPr>
           <a:xfrm>
             <a:off x="20292142" y="4464502"/>
-            <a:ext cx="8425733" cy="1261884"/>
+            <a:ext cx="8425733" cy="3477875"/>
           </a:xfrm>
           <a:prstGeom prst="rect">
             <a:avLst/>
@@ -3223,17 +3245,60 @@
                   <a:schemeClr val="tx2"/>
                 </a:solidFill>
               </a:rPr>
-              <a:t>Future Work</a:t>
-            </a:r>
-          </a:p>
-          <a:p>
-            <a:r>
-              <a:rPr lang="en-US" sz="3600" dirty="0" smtClean="0">
+              <a:t>Remaining and Future </a:t>
+            </a:r>
+            <a:r>
+              <a:rPr lang="en-US" sz="4000" b="1" dirty="0" smtClean="0">
                 <a:solidFill>
                   <a:schemeClr val="tx2"/>
                 </a:solidFill>
               </a:rPr>
-              <a:t>STUFFFFFFFFFFFFFFFFFFFFFFFFFFFFFFF</a:t>
+              <a:t>Work</a:t>
+            </a:r>
+          </a:p>
+          <a:p>
+            <a:pPr marL="571500" indent="-571500">
+              <a:buFont typeface="Arial" panose="020B0604020202020204" pitchFamily="34" charset="0"/>
+              <a:buChar char="•"/>
+            </a:pPr>
+            <a:r>
+              <a:rPr lang="en-US" sz="3600" dirty="0" smtClean="0"/>
+              <a:t>Finish writing code</a:t>
+            </a:r>
+          </a:p>
+          <a:p>
+            <a:pPr marL="571500" indent="-571500">
+              <a:buFont typeface="Arial" panose="020B0604020202020204" pitchFamily="34" charset="0"/>
+              <a:buChar char="•"/>
+            </a:pPr>
+            <a:r>
+              <a:rPr lang="en-US" sz="3600" dirty="0" smtClean="0"/>
+              <a:t>Fix issues between Kinect and </a:t>
+            </a:r>
+            <a:r>
+              <a:rPr lang="en-US" sz="3600" dirty="0" err="1" smtClean="0"/>
+              <a:t>MinnowBoard</a:t>
+            </a:r>
+            <a:endParaRPr lang="en-US" sz="3600" dirty="0" smtClean="0"/>
+          </a:p>
+          <a:p>
+            <a:pPr marL="571500" indent="-571500">
+              <a:buFont typeface="Arial" panose="020B0604020202020204" pitchFamily="34" charset="0"/>
+              <a:buChar char="•"/>
+            </a:pPr>
+            <a:r>
+              <a:rPr lang="en-US" sz="3600" dirty="0" smtClean="0"/>
+              <a:t>Validate system design</a:t>
+            </a:r>
+          </a:p>
+          <a:p>
+            <a:pPr marL="571500" indent="-571500">
+              <a:buFont typeface="Arial" panose="020B0604020202020204" pitchFamily="34" charset="0"/>
+              <a:buChar char="•"/>
+            </a:pPr>
+            <a:r>
+              <a:rPr lang="en-US" sz="3600" dirty="0" smtClean="0"/>
+              <a:t>Add more drone types to the system</a:t>
             </a:r>
             <a:endParaRPr lang="en-US" sz="3600" dirty="0"/>
           </a:p>
@@ -3277,7 +3342,7 @@
         </p:nvSpPr>
         <p:spPr>
           <a:xfrm>
-            <a:off x="1631783" y="12901617"/>
+            <a:off x="1631766" y="13263979"/>
             <a:ext cx="9064911" cy="4585871"/>
           </a:xfrm>
           <a:prstGeom prst="rect">
@@ -3302,12 +3367,20 @@
           </a:p>
           <a:p>
             <a:r>
-              <a:rPr lang="en-US" sz="3600" dirty="0" smtClean="0">
-                <a:solidFill>
-                  <a:schemeClr val="tx2"/>
-                </a:solidFill>
-              </a:rPr>
-              <a:t>The current system uses a single Kinect camera which limits the total field of view. By adding more Kinect cameras, the area covered by the localization method is expanded so more tests can be run across a larger area. Additionally, the architecture could be used for other, similar distributed systems.</a:t>
+              <a:rPr lang="en-US" sz="3600" dirty="0" smtClean="0"/>
+              <a:t>The current system uses a single Kinect camera which limits the total field of view. By adding more Kinect cameras, the area covered by the localization method is expanded </a:t>
+            </a:r>
+            <a:r>
+              <a:rPr lang="en-US" sz="3600" dirty="0" smtClean="0"/>
+              <a:t>so </a:t>
+            </a:r>
+            <a:r>
+              <a:rPr lang="en-US" sz="3600" dirty="0" smtClean="0"/>
+              <a:t>tests can be run across a larger area. Additionally, the architecture could be used for other, similar distributed </a:t>
+            </a:r>
+            <a:r>
+              <a:rPr lang="en-US" sz="3600" dirty="0" smtClean="0"/>
+              <a:t>systems</a:t>
             </a:r>
             <a:endParaRPr lang="en-US" sz="3600" dirty="0"/>
           </a:p>
@@ -3337,102 +3410,405 @@
           <a:p>
             <a:r>
               <a:rPr lang="en-US" sz="3400" dirty="0" smtClean="0"/>
-              <a:t>Nathaniel Paul Hamilton ● PhD Student at Vanderbilt University, Electrical Engineering ● nathaniel.p.hamilton@Vanderbilt.edu ● Advisor: Dr. Taylor Johnson</a:t>
+              <a:t>Nathaniel Paul Hamilton ● PhD Student at Vanderbilt University, Electrical Engineering ● </a:t>
+            </a:r>
+            <a:r>
+              <a:rPr lang="en-US" sz="3400" dirty="0" smtClean="0"/>
+              <a:t>nathaniel.p.hamilton@vanderbilt.edu </a:t>
+            </a:r>
+            <a:r>
+              <a:rPr lang="en-US" sz="3400" dirty="0" smtClean="0"/>
+              <a:t>● Advisor: Dr. Taylor Johnson</a:t>
             </a:r>
             <a:endParaRPr lang="en-US" sz="3400" dirty="0"/>
           </a:p>
         </p:txBody>
       </p:sp>
-      <p:pic>
-        <p:nvPicPr>
-          <p:cNvPr id="12" name="Picture 11"/>
-          <p:cNvPicPr>
-            <a:picLocks noChangeAspect="1"/>
-          </p:cNvPicPr>
+      <p:sp>
+        <p:nvSpPr>
+          <p:cNvPr id="15" name="TextBox 14"/>
+          <p:cNvSpPr txBox="1"/>
           <p:nvPr/>
-        </p:nvPicPr>
-        <p:blipFill>
-          <a:blip r:embed="rId4">
-            <a:extLst>
-              <a:ext uri="{28A0092B-C50C-407E-A947-70E740481C1C}">
-                <a14:useLocalDpi xmlns:a14="http://schemas.microsoft.com/office/drawing/2010/main" val="0"/>
-              </a:ext>
-            </a:extLst>
-          </a:blip>
-          <a:stretch>
-            <a:fillRect/>
-          </a:stretch>
-        </p:blipFill>
+        </p:nvSpPr>
         <p:spPr>
           <a:xfrm>
-            <a:off x="10961962" y="5301459"/>
-            <a:ext cx="8896469" cy="4388227"/>
+            <a:off x="20292141" y="15413999"/>
+            <a:ext cx="8425733" cy="1261884"/>
           </a:xfrm>
           <a:prstGeom prst="rect">
             <a:avLst/>
           </a:prstGeom>
+          <a:noFill/>
         </p:spPr>
-      </p:pic>
-      <p:pic>
-        <p:nvPicPr>
-          <p:cNvPr id="13" name="Picture 12"/>
-          <p:cNvPicPr>
-            <a:picLocks noChangeAspect="1"/>
-          </p:cNvPicPr>
+        <p:txBody>
+          <a:bodyPr wrap="square" rtlCol="0">
+            <a:spAutoFit/>
+          </a:bodyPr>
+          <a:lstStyle/>
+          <a:p>
+            <a:r>
+              <a:rPr lang="en-US" sz="4000" b="1" dirty="0" smtClean="0">
+                <a:solidFill>
+                  <a:schemeClr val="tx2"/>
+                </a:solidFill>
+              </a:rPr>
+              <a:t>Acknowledgments</a:t>
+            </a:r>
+            <a:endParaRPr lang="en-US" sz="4000" b="1" dirty="0" smtClean="0">
+              <a:solidFill>
+                <a:schemeClr val="tx2"/>
+              </a:solidFill>
+            </a:endParaRPr>
+          </a:p>
+          <a:p>
+            <a:r>
+              <a:rPr lang="en-US" sz="3600" dirty="0" smtClean="0"/>
+              <a:t>I am not sure what to put here</a:t>
+            </a:r>
+            <a:endParaRPr lang="en-US" sz="3600" dirty="0"/>
+          </a:p>
+        </p:txBody>
+      </p:sp>
+      <p:grpSp>
+        <p:nvGrpSpPr>
+          <p:cNvPr id="22" name="Group 21"/>
+          <p:cNvGrpSpPr/>
           <p:nvPr/>
-        </p:nvPicPr>
-        <p:blipFill>
-          <a:blip r:embed="rId5">
-            <a:extLst>
-              <a:ext uri="{28A0092B-C50C-407E-A947-70E740481C1C}">
-                <a14:useLocalDpi xmlns:a14="http://schemas.microsoft.com/office/drawing/2010/main" val="0"/>
-              </a:ext>
-            </a:extLst>
-          </a:blip>
-          <a:stretch>
-            <a:fillRect/>
-          </a:stretch>
-        </p:blipFill>
-        <p:spPr>
+        </p:nvGrpSpPr>
+        <p:grpSpPr>
           <a:xfrm>
-            <a:off x="11389025" y="10583688"/>
-            <a:ext cx="8681680" cy="7764528"/>
+            <a:off x="1631765" y="17849850"/>
+            <a:ext cx="9064912" cy="5563163"/>
+            <a:chOff x="1631778" y="12828922"/>
+            <a:chExt cx="9064912" cy="5563163"/>
           </a:xfrm>
-          <a:prstGeom prst="rect">
-            <a:avLst/>
-          </a:prstGeom>
-        </p:spPr>
-      </p:pic>
-      <p:pic>
-        <p:nvPicPr>
-          <p:cNvPr id="14" name="Picture 13"/>
-          <p:cNvPicPr>
-            <a:picLocks noChangeAspect="1"/>
-          </p:cNvPicPr>
+        </p:grpSpPr>
+        <p:sp>
+          <p:nvSpPr>
+            <p:cNvPr id="18" name="TextBox 17"/>
+            <p:cNvSpPr txBox="1"/>
+            <p:nvPr/>
+          </p:nvSpPr>
+          <p:spPr>
+            <a:xfrm>
+              <a:off x="1631779" y="12828922"/>
+              <a:ext cx="9064911" cy="707886"/>
+            </a:xfrm>
+            <a:prstGeom prst="rect">
+              <a:avLst/>
+            </a:prstGeom>
+            <a:noFill/>
+          </p:spPr>
+          <p:txBody>
+            <a:bodyPr wrap="square" rtlCol="0">
+              <a:spAutoFit/>
+            </a:bodyPr>
+            <a:lstStyle/>
+            <a:p>
+              <a:r>
+                <a:rPr lang="en-US" sz="4000" b="1" dirty="0" smtClean="0">
+                  <a:solidFill>
+                    <a:schemeClr val="tx2"/>
+                  </a:solidFill>
+                </a:rPr>
+                <a:t>Current Setup </a:t>
+              </a:r>
+              <a:r>
+                <a:rPr lang="en-US" b="1" dirty="0" smtClean="0">
+                  <a:solidFill>
+                    <a:schemeClr val="tx2"/>
+                  </a:solidFill>
+                </a:rPr>
+                <a:t>[1]</a:t>
+              </a:r>
+              <a:endParaRPr lang="en-US" b="1" dirty="0" smtClean="0">
+                <a:solidFill>
+                  <a:schemeClr val="tx2"/>
+                </a:solidFill>
+              </a:endParaRPr>
+            </a:p>
+          </p:txBody>
+        </p:sp>
+        <p:pic>
+          <p:nvPicPr>
+            <p:cNvPr id="20" name="Picture 19"/>
+            <p:cNvPicPr>
+              <a:picLocks noChangeAspect="1"/>
+            </p:cNvPicPr>
+            <p:nvPr/>
+          </p:nvPicPr>
+          <p:blipFill>
+            <a:blip r:embed="rId4">
+              <a:extLst>
+                <a:ext uri="{28A0092B-C50C-407E-A947-70E740481C1C}">
+                  <a14:useLocalDpi xmlns:a14="http://schemas.microsoft.com/office/drawing/2010/main" val="0"/>
+                </a:ext>
+              </a:extLst>
+            </a:blip>
+            <a:stretch>
+              <a:fillRect/>
+            </a:stretch>
+          </p:blipFill>
+          <p:spPr>
+            <a:xfrm>
+              <a:off x="1631778" y="13286685"/>
+              <a:ext cx="6686550" cy="5105400"/>
+            </a:xfrm>
+            <a:prstGeom prst="rect">
+              <a:avLst/>
+            </a:prstGeom>
+          </p:spPr>
+        </p:pic>
+      </p:grpSp>
+      <p:grpSp>
+        <p:nvGrpSpPr>
+          <p:cNvPr id="23" name="Group 22"/>
+          <p:cNvGrpSpPr/>
           <p:nvPr/>
-        </p:nvPicPr>
-        <p:blipFill>
-          <a:blip r:embed="rId6">
-            <a:extLst>
-              <a:ext uri="{28A0092B-C50C-407E-A947-70E740481C1C}">
-                <a14:useLocalDpi xmlns:a14="http://schemas.microsoft.com/office/drawing/2010/main" val="0"/>
-              </a:ext>
-            </a:extLst>
-          </a:blip>
-          <a:stretch>
-            <a:fillRect/>
-          </a:stretch>
-        </p:blipFill>
-        <p:spPr>
+        </p:nvGrpSpPr>
+        <p:grpSpPr>
           <a:xfrm>
-            <a:off x="1631783" y="7999424"/>
-            <a:ext cx="9064911" cy="4961482"/>
+            <a:off x="1631772" y="8024545"/>
+            <a:ext cx="9544973" cy="5632439"/>
+            <a:chOff x="1631778" y="18141961"/>
+            <a:chExt cx="9544973" cy="5632439"/>
           </a:xfrm>
-          <a:prstGeom prst="rect">
-            <a:avLst/>
-          </a:prstGeom>
-        </p:spPr>
-      </p:pic>
+        </p:grpSpPr>
+        <p:sp>
+          <p:nvSpPr>
+            <p:cNvPr id="17" name="TextBox 16"/>
+            <p:cNvSpPr txBox="1"/>
+            <p:nvPr/>
+          </p:nvSpPr>
+          <p:spPr>
+            <a:xfrm>
+              <a:off x="1631778" y="18141961"/>
+              <a:ext cx="9064911" cy="707886"/>
+            </a:xfrm>
+            <a:prstGeom prst="rect">
+              <a:avLst/>
+            </a:prstGeom>
+            <a:noFill/>
+          </p:spPr>
+          <p:txBody>
+            <a:bodyPr wrap="square" rtlCol="0">
+              <a:spAutoFit/>
+            </a:bodyPr>
+            <a:lstStyle/>
+            <a:p>
+              <a:r>
+                <a:rPr lang="en-US" sz="4000" b="1" dirty="0" smtClean="0">
+                  <a:solidFill>
+                    <a:schemeClr val="tx2"/>
+                  </a:solidFill>
+                </a:rPr>
+                <a:t>Desired Setup</a:t>
+              </a:r>
+              <a:endParaRPr lang="en-US" sz="4000" b="1" dirty="0" smtClean="0">
+                <a:solidFill>
+                  <a:schemeClr val="tx2"/>
+                </a:solidFill>
+              </a:endParaRPr>
+            </a:p>
+          </p:txBody>
+        </p:sp>
+        <p:pic>
+          <p:nvPicPr>
+            <p:cNvPr id="21" name="Picture 20"/>
+            <p:cNvPicPr>
+              <a:picLocks noChangeAspect="1"/>
+            </p:cNvPicPr>
+            <p:nvPr/>
+          </p:nvPicPr>
+          <p:blipFill>
+            <a:blip r:embed="rId5">
+              <a:extLst>
+                <a:ext uri="{28A0092B-C50C-407E-A947-70E740481C1C}">
+                  <a14:useLocalDpi xmlns:a14="http://schemas.microsoft.com/office/drawing/2010/main" val="0"/>
+                </a:ext>
+              </a:extLst>
+            </a:blip>
+            <a:stretch>
+              <a:fillRect/>
+            </a:stretch>
+          </p:blipFill>
+          <p:spPr>
+            <a:xfrm>
+              <a:off x="1631778" y="18550167"/>
+              <a:ext cx="9544973" cy="5224233"/>
+            </a:xfrm>
+            <a:prstGeom prst="rect">
+              <a:avLst/>
+            </a:prstGeom>
+          </p:spPr>
+        </p:pic>
+      </p:grpSp>
+      <p:grpSp>
+        <p:nvGrpSpPr>
+          <p:cNvPr id="27" name="Group 26"/>
+          <p:cNvGrpSpPr/>
+          <p:nvPr/>
+        </p:nvGrpSpPr>
+        <p:grpSpPr>
+          <a:xfrm>
+            <a:off x="11227229" y="9830970"/>
+            <a:ext cx="9064911" cy="5027703"/>
+            <a:chOff x="11153568" y="10178472"/>
+            <a:chExt cx="9064911" cy="5027703"/>
+          </a:xfrm>
+        </p:grpSpPr>
+        <p:pic>
+          <p:nvPicPr>
+            <p:cNvPr id="12" name="Picture 11"/>
+            <p:cNvPicPr>
+              <a:picLocks noChangeAspect="1"/>
+            </p:cNvPicPr>
+            <p:nvPr/>
+          </p:nvPicPr>
+          <p:blipFill>
+            <a:blip r:embed="rId6">
+              <a:extLst>
+                <a:ext uri="{28A0092B-C50C-407E-A947-70E740481C1C}">
+                  <a14:useLocalDpi xmlns:a14="http://schemas.microsoft.com/office/drawing/2010/main" val="0"/>
+                </a:ext>
+              </a:extLst>
+            </a:blip>
+            <a:stretch>
+              <a:fillRect/>
+            </a:stretch>
+          </p:blipFill>
+          <p:spPr>
+            <a:xfrm>
+              <a:off x="11176745" y="10817948"/>
+              <a:ext cx="8896469" cy="4388227"/>
+            </a:xfrm>
+            <a:prstGeom prst="rect">
+              <a:avLst/>
+            </a:prstGeom>
+          </p:spPr>
+        </p:pic>
+        <p:sp>
+          <p:nvSpPr>
+            <p:cNvPr id="25" name="TextBox 24"/>
+            <p:cNvSpPr txBox="1"/>
+            <p:nvPr/>
+          </p:nvSpPr>
+          <p:spPr>
+            <a:xfrm>
+              <a:off x="11153568" y="10178472"/>
+              <a:ext cx="9064911" cy="707886"/>
+            </a:xfrm>
+            <a:prstGeom prst="rect">
+              <a:avLst/>
+            </a:prstGeom>
+            <a:noFill/>
+          </p:spPr>
+          <p:txBody>
+            <a:bodyPr wrap="square" rtlCol="0">
+              <a:spAutoFit/>
+            </a:bodyPr>
+            <a:lstStyle/>
+            <a:p>
+              <a:r>
+                <a:rPr lang="en-US" sz="4000" b="1" dirty="0" smtClean="0">
+                  <a:solidFill>
+                    <a:schemeClr val="tx2"/>
+                  </a:solidFill>
+                </a:rPr>
+                <a:t>Central Command Code Schematic</a:t>
+              </a:r>
+              <a:endParaRPr lang="en-US" sz="4000" b="1" dirty="0" smtClean="0">
+                <a:solidFill>
+                  <a:schemeClr val="tx2"/>
+                </a:solidFill>
+              </a:endParaRPr>
+            </a:p>
+          </p:txBody>
+        </p:sp>
+      </p:grpSp>
+      <p:grpSp>
+        <p:nvGrpSpPr>
+          <p:cNvPr id="24" name="Group 23"/>
+          <p:cNvGrpSpPr/>
+          <p:nvPr/>
+        </p:nvGrpSpPr>
+        <p:grpSpPr>
+          <a:xfrm>
+            <a:off x="11176745" y="14623500"/>
+            <a:ext cx="9088088" cy="8503187"/>
+            <a:chOff x="11153568" y="15045531"/>
+            <a:chExt cx="9088088" cy="8503187"/>
+          </a:xfrm>
+        </p:grpSpPr>
+        <p:pic>
+          <p:nvPicPr>
+            <p:cNvPr id="13" name="Picture 12"/>
+            <p:cNvPicPr>
+              <a:picLocks noChangeAspect="1"/>
+            </p:cNvPicPr>
+            <p:nvPr/>
+          </p:nvPicPr>
+          <p:blipFill>
+            <a:blip r:embed="rId7">
+              <a:extLst>
+                <a:ext uri="{28A0092B-C50C-407E-A947-70E740481C1C}">
+                  <a14:useLocalDpi xmlns:a14="http://schemas.microsoft.com/office/drawing/2010/main" val="0"/>
+                </a:ext>
+              </a:extLst>
+            </a:blip>
+            <a:stretch>
+              <a:fillRect/>
+            </a:stretch>
+          </p:blipFill>
+          <p:spPr>
+            <a:xfrm>
+              <a:off x="11153568" y="15784190"/>
+              <a:ext cx="8681680" cy="7764528"/>
+            </a:xfrm>
+            <a:prstGeom prst="rect">
+              <a:avLst/>
+            </a:prstGeom>
+          </p:spPr>
+        </p:pic>
+        <p:sp>
+          <p:nvSpPr>
+            <p:cNvPr id="26" name="TextBox 25"/>
+            <p:cNvSpPr txBox="1"/>
+            <p:nvPr/>
+          </p:nvSpPr>
+          <p:spPr>
+            <a:xfrm>
+              <a:off x="11176745" y="15045531"/>
+              <a:ext cx="9064911" cy="707886"/>
+            </a:xfrm>
+            <a:prstGeom prst="rect">
+              <a:avLst/>
+            </a:prstGeom>
+            <a:noFill/>
+          </p:spPr>
+          <p:txBody>
+            <a:bodyPr wrap="square" rtlCol="0">
+              <a:spAutoFit/>
+            </a:bodyPr>
+            <a:lstStyle/>
+            <a:p>
+              <a:r>
+                <a:rPr lang="en-US" sz="4000" b="1" dirty="0" smtClean="0">
+                  <a:solidFill>
+                    <a:schemeClr val="tx2"/>
+                  </a:solidFill>
+                </a:rPr>
+                <a:t>Robot Observer Code Schematic</a:t>
+              </a:r>
+              <a:endParaRPr lang="en-US" sz="4000" b="1" dirty="0" smtClean="0">
+                <a:solidFill>
+                  <a:schemeClr val="tx2"/>
+                </a:solidFill>
+              </a:endParaRPr>
+            </a:p>
+          </p:txBody>
+        </p:sp>
+      </p:grpSp>
     </p:spTree>
     <p:extLst>
       <p:ext uri="{BB962C8B-B14F-4D97-AF65-F5344CB8AC3E}">

</xml_diff>

<commit_message>
recreated the kinect code schematic image so it makes more sense and is accurate
</commit_message>
<xml_diff>
--- a/documentation/poster/poster.pptx
+++ b/documentation/poster/poster.pptx
@@ -243,7 +243,7 @@
           <a:p>
             <a:fld id="{00A5CD91-B80E-4D93-AA1A-3B67EAF1B994}" type="datetimeFigureOut">
               <a:rPr lang="en-US" smtClean="0"/>
-              <a:t>7/20/2017</a:t>
+              <a:t>7/21/2017</a:t>
             </a:fld>
             <a:endParaRPr lang="en-US"/>
           </a:p>
@@ -413,7 +413,7 @@
           <a:p>
             <a:fld id="{00A5CD91-B80E-4D93-AA1A-3B67EAF1B994}" type="datetimeFigureOut">
               <a:rPr lang="en-US" smtClean="0"/>
-              <a:t>7/20/2017</a:t>
+              <a:t>7/21/2017</a:t>
             </a:fld>
             <a:endParaRPr lang="en-US"/>
           </a:p>
@@ -593,7 +593,7 @@
           <a:p>
             <a:fld id="{00A5CD91-B80E-4D93-AA1A-3B67EAF1B994}" type="datetimeFigureOut">
               <a:rPr lang="en-US" smtClean="0"/>
-              <a:t>7/20/2017</a:t>
+              <a:t>7/21/2017</a:t>
             </a:fld>
             <a:endParaRPr lang="en-US"/>
           </a:p>
@@ -763,7 +763,7 @@
           <a:p>
             <a:fld id="{00A5CD91-B80E-4D93-AA1A-3B67EAF1B994}" type="datetimeFigureOut">
               <a:rPr lang="en-US" smtClean="0"/>
-              <a:t>7/20/2017</a:t>
+              <a:t>7/21/2017</a:t>
             </a:fld>
             <a:endParaRPr lang="en-US"/>
           </a:p>
@@ -1007,7 +1007,7 @@
           <a:p>
             <a:fld id="{00A5CD91-B80E-4D93-AA1A-3B67EAF1B994}" type="datetimeFigureOut">
               <a:rPr lang="en-US" smtClean="0"/>
-              <a:t>7/20/2017</a:t>
+              <a:t>7/21/2017</a:t>
             </a:fld>
             <a:endParaRPr lang="en-US"/>
           </a:p>
@@ -1239,7 +1239,7 @@
           <a:p>
             <a:fld id="{00A5CD91-B80E-4D93-AA1A-3B67EAF1B994}" type="datetimeFigureOut">
               <a:rPr lang="en-US" smtClean="0"/>
-              <a:t>7/20/2017</a:t>
+              <a:t>7/21/2017</a:t>
             </a:fld>
             <a:endParaRPr lang="en-US"/>
           </a:p>
@@ -1606,7 +1606,7 @@
           <a:p>
             <a:fld id="{00A5CD91-B80E-4D93-AA1A-3B67EAF1B994}" type="datetimeFigureOut">
               <a:rPr lang="en-US" smtClean="0"/>
-              <a:t>7/20/2017</a:t>
+              <a:t>7/21/2017</a:t>
             </a:fld>
             <a:endParaRPr lang="en-US"/>
           </a:p>
@@ -1724,7 +1724,7 @@
           <a:p>
             <a:fld id="{00A5CD91-B80E-4D93-AA1A-3B67EAF1B994}" type="datetimeFigureOut">
               <a:rPr lang="en-US" smtClean="0"/>
-              <a:t>7/20/2017</a:t>
+              <a:t>7/21/2017</a:t>
             </a:fld>
             <a:endParaRPr lang="en-US"/>
           </a:p>
@@ -1819,7 +1819,7 @@
           <a:p>
             <a:fld id="{00A5CD91-B80E-4D93-AA1A-3B67EAF1B994}" type="datetimeFigureOut">
               <a:rPr lang="en-US" smtClean="0"/>
-              <a:t>7/20/2017</a:t>
+              <a:t>7/21/2017</a:t>
             </a:fld>
             <a:endParaRPr lang="en-US"/>
           </a:p>
@@ -2096,7 +2096,7 @@
           <a:p>
             <a:fld id="{00A5CD91-B80E-4D93-AA1A-3B67EAF1B994}" type="datetimeFigureOut">
               <a:rPr lang="en-US" smtClean="0"/>
-              <a:t>7/20/2017</a:t>
+              <a:t>7/21/2017</a:t>
             </a:fld>
             <a:endParaRPr lang="en-US"/>
           </a:p>
@@ -2353,7 +2353,7 @@
           <a:p>
             <a:fld id="{00A5CD91-B80E-4D93-AA1A-3B67EAF1B994}" type="datetimeFigureOut">
               <a:rPr lang="en-US" smtClean="0"/>
-              <a:t>7/20/2017</a:t>
+              <a:t>7/21/2017</a:t>
             </a:fld>
             <a:endParaRPr lang="en-US"/>
           </a:p>
@@ -2566,7 +2566,7 @@
           <a:p>
             <a:fld id="{00A5CD91-B80E-4D93-AA1A-3B67EAF1B994}" type="datetimeFigureOut">
               <a:rPr lang="en-US" smtClean="0"/>
-              <a:t>7/20/2017</a:t>
+              <a:t>7/21/2017</a:t>
             </a:fld>
             <a:endParaRPr lang="en-US"/>
           </a:p>
@@ -3081,11 +3081,7 @@
             </a:r>
             <a:r>
               <a:rPr lang="en-US" sz="3600" dirty="0" smtClean="0"/>
-              <a:t>evelop </a:t>
-            </a:r>
-            <a:r>
-              <a:rPr lang="en-US" sz="3600" dirty="0" smtClean="0"/>
-              <a:t>an architecture for providing localization information to robots using StarL across the view of multiple Kinect cameras connected to x86 </a:t>
+              <a:t>evelop an architecture for providing localization information to robots using StarL across the view of multiple Kinect cameras connected to x86 </a:t>
             </a:r>
             <a:r>
               <a:rPr lang="en-US" sz="3600" dirty="0" err="1" smtClean="0"/>
@@ -3093,11 +3089,7 @@
             </a:r>
             <a:r>
               <a:rPr lang="en-US" sz="3600" dirty="0" smtClean="0"/>
-              <a:t> in a Fog Computing </a:t>
-            </a:r>
-            <a:r>
-              <a:rPr lang="en-US" sz="3600" dirty="0" smtClean="0"/>
-              <a:t>fashion</a:t>
+              <a:t> in a Fog Computing fashion</a:t>
             </a:r>
             <a:endParaRPr lang="en-US" sz="3600" dirty="0"/>
           </a:p>
@@ -3193,15 +3185,7 @@
             </a:pPr>
             <a:r>
               <a:rPr lang="en-US" sz="3600" dirty="0" smtClean="0"/>
-              <a:t>Central Command records position information and informs each </a:t>
-            </a:r>
-            <a:r>
-              <a:rPr lang="en-US" sz="3600" dirty="0" smtClean="0"/>
-              <a:t>Robot Observer </a:t>
-            </a:r>
-            <a:r>
-              <a:rPr lang="en-US" sz="3600" dirty="0" smtClean="0"/>
-              <a:t>node which drones to look for</a:t>
+              <a:t>Central Command records position information and informs each Robot Observer node which drones to look for</a:t>
             </a:r>
           </a:p>
           <a:p>
@@ -3245,15 +3229,7 @@
                   <a:schemeClr val="tx2"/>
                 </a:solidFill>
               </a:rPr>
-              <a:t>Remaining and Future </a:t>
-            </a:r>
-            <a:r>
-              <a:rPr lang="en-US" sz="4000" b="1" dirty="0" smtClean="0">
-                <a:solidFill>
-                  <a:schemeClr val="tx2"/>
-                </a:solidFill>
-              </a:rPr>
-              <a:t>Work</a:t>
+              <a:t>Remaining and Future Work</a:t>
             </a:r>
           </a:p>
           <a:p>
@@ -3368,19 +3344,7 @@
           <a:p>
             <a:r>
               <a:rPr lang="en-US" sz="3600" dirty="0" smtClean="0"/>
-              <a:t>The current system uses a single Kinect camera which limits the total field of view. By adding more Kinect cameras, the area covered by the localization method is expanded </a:t>
-            </a:r>
-            <a:r>
-              <a:rPr lang="en-US" sz="3600" dirty="0" smtClean="0"/>
-              <a:t>so </a:t>
-            </a:r>
-            <a:r>
-              <a:rPr lang="en-US" sz="3600" dirty="0" smtClean="0"/>
-              <a:t>tests can be run across a larger area. Additionally, the architecture could be used for other, similar distributed </a:t>
-            </a:r>
-            <a:r>
-              <a:rPr lang="en-US" sz="3600" dirty="0" smtClean="0"/>
-              <a:t>systems</a:t>
+              <a:t>The current system uses a single Kinect camera which limits the total field of view. By adding more Kinect cameras, the area covered by the localization method is expanded so tests can be run across a larger area. Additionally, the architecture could be used for other, similar distributed systems</a:t>
             </a:r>
             <a:endParaRPr lang="en-US" sz="3600" dirty="0"/>
           </a:p>
@@ -3410,15 +3374,7 @@
           <a:p>
             <a:r>
               <a:rPr lang="en-US" sz="3400" dirty="0" smtClean="0"/>
-              <a:t>Nathaniel Paul Hamilton ● PhD Student at Vanderbilt University, Electrical Engineering ● </a:t>
-            </a:r>
-            <a:r>
-              <a:rPr lang="en-US" sz="3400" dirty="0" smtClean="0"/>
-              <a:t>nathaniel.p.hamilton@vanderbilt.edu </a:t>
-            </a:r>
-            <a:r>
-              <a:rPr lang="en-US" sz="3400" dirty="0" smtClean="0"/>
-              <a:t>● Advisor: Dr. Taylor Johnson</a:t>
+              <a:t>Nathaniel Paul Hamilton ● PhD Student at Vanderbilt University, Electrical Engineering ● nathaniel.p.hamilton@vanderbilt.edu ● Advisor: Dr. Taylor Johnson</a:t>
             </a:r>
             <a:endParaRPr lang="en-US" sz="3400" dirty="0"/>
           </a:p>
@@ -3454,11 +3410,6 @@
               </a:rPr>
               <a:t>Acknowledgments</a:t>
             </a:r>
-            <a:endParaRPr lang="en-US" sz="4000" b="1" dirty="0" smtClean="0">
-              <a:solidFill>
-                <a:schemeClr val="tx2"/>
-              </a:solidFill>
-            </a:endParaRPr>
           </a:p>
           <a:p>
             <a:r>
@@ -3521,11 +3472,6 @@
                 </a:rPr>
                 <a:t>[1]</a:t>
               </a:r>
-              <a:endParaRPr lang="en-US" b="1" dirty="0" smtClean="0">
-                <a:solidFill>
-                  <a:schemeClr val="tx2"/>
-                </a:solidFill>
-              </a:endParaRPr>
             </a:p>
           </p:txBody>
         </p:sp>
@@ -3604,11 +3550,6 @@
                 </a:rPr>
                 <a:t>Desired Setup</a:t>
               </a:r>
-              <a:endParaRPr lang="en-US" sz="4000" b="1" dirty="0" smtClean="0">
-                <a:solidFill>
-                  <a:schemeClr val="tx2"/>
-                </a:solidFill>
-              </a:endParaRPr>
             </a:p>
           </p:txBody>
         </p:sp>
@@ -3717,59 +3658,24 @@
                 </a:rPr>
                 <a:t>Central Command Code Schematic</a:t>
               </a:r>
-              <a:endParaRPr lang="en-US" sz="4000" b="1" dirty="0" smtClean="0">
-                <a:solidFill>
-                  <a:schemeClr val="tx2"/>
-                </a:solidFill>
-              </a:endParaRPr>
             </a:p>
           </p:txBody>
         </p:sp>
       </p:grpSp>
       <p:grpSp>
         <p:nvGrpSpPr>
-          <p:cNvPr id="24" name="Group 23"/>
+          <p:cNvPr id="10" name="Group 9"/>
           <p:cNvGrpSpPr/>
           <p:nvPr/>
         </p:nvGrpSpPr>
         <p:grpSpPr>
           <a:xfrm>
-            <a:off x="11176745" y="14623500"/>
-            <a:ext cx="9088088" cy="8503187"/>
-            <a:chOff x="11153568" y="15045531"/>
-            <a:chExt cx="9088088" cy="8503187"/>
+            <a:off x="11250406" y="15085839"/>
+            <a:ext cx="9064911" cy="7851348"/>
+            <a:chOff x="11250406" y="15085839"/>
+            <a:chExt cx="9064911" cy="7851348"/>
           </a:xfrm>
         </p:grpSpPr>
-        <p:pic>
-          <p:nvPicPr>
-            <p:cNvPr id="13" name="Picture 12"/>
-            <p:cNvPicPr>
-              <a:picLocks noChangeAspect="1"/>
-            </p:cNvPicPr>
-            <p:nvPr/>
-          </p:nvPicPr>
-          <p:blipFill>
-            <a:blip r:embed="rId7">
-              <a:extLst>
-                <a:ext uri="{28A0092B-C50C-407E-A947-70E740481C1C}">
-                  <a14:useLocalDpi xmlns:a14="http://schemas.microsoft.com/office/drawing/2010/main" val="0"/>
-                </a:ext>
-              </a:extLst>
-            </a:blip>
-            <a:stretch>
-              <a:fillRect/>
-            </a:stretch>
-          </p:blipFill>
-          <p:spPr>
-            <a:xfrm>
-              <a:off x="11153568" y="15784190"/>
-              <a:ext cx="8681680" cy="7764528"/>
-            </a:xfrm>
-            <a:prstGeom prst="rect">
-              <a:avLst/>
-            </a:prstGeom>
-          </p:spPr>
-        </p:pic>
         <p:sp>
           <p:nvSpPr>
             <p:cNvPr id="26" name="TextBox 25"/>
@@ -3778,7 +3684,7 @@
           </p:nvSpPr>
           <p:spPr>
             <a:xfrm>
-              <a:off x="11176745" y="15045531"/>
+              <a:off x="11250406" y="15085839"/>
               <a:ext cx="9064911" cy="707886"/>
             </a:xfrm>
             <a:prstGeom prst="rect">
@@ -3800,14 +3706,39 @@
                 </a:rPr>
                 <a:t>Robot Observer Code Schematic</a:t>
               </a:r>
-              <a:endParaRPr lang="en-US" sz="4000" b="1" dirty="0" smtClean="0">
-                <a:solidFill>
-                  <a:schemeClr val="tx2"/>
-                </a:solidFill>
-              </a:endParaRPr>
             </a:p>
           </p:txBody>
         </p:sp>
+        <p:pic>
+          <p:nvPicPr>
+            <p:cNvPr id="3" name="Picture 2"/>
+            <p:cNvPicPr>
+              <a:picLocks noChangeAspect="1"/>
+            </p:cNvPicPr>
+            <p:nvPr/>
+          </p:nvPicPr>
+          <p:blipFill>
+            <a:blip r:embed="rId7">
+              <a:extLst>
+                <a:ext uri="{28A0092B-C50C-407E-A947-70E740481C1C}">
+                  <a14:useLocalDpi xmlns:a14="http://schemas.microsoft.com/office/drawing/2010/main" val="0"/>
+                </a:ext>
+              </a:extLst>
+            </a:blip>
+            <a:stretch>
+              <a:fillRect/>
+            </a:stretch>
+          </p:blipFill>
+          <p:spPr>
+            <a:xfrm>
+              <a:off x="11488647" y="15646418"/>
+              <a:ext cx="7843100" cy="7290769"/>
+            </a:xfrm>
+            <a:prstGeom prst="rect">
+              <a:avLst/>
+            </a:prstGeom>
+          </p:spPr>
+        </p:pic>
       </p:grpSp>
     </p:spTree>
     <p:extLst>

</xml_diff>

<commit_message>
updated schematic figures and included sections about subscriptions. Added the png files so they are not lost.
</commit_message>
<xml_diff>
--- a/documentation/poster/poster.pptx
+++ b/documentation/poster/poster.pptx
@@ -112,6 +112,10 @@
 </p:presentation>
 </file>
 
+<file path=ppt/revisionInfo.xml><?xml version="1.0" encoding="utf-8"?>
+<p1510:revInfo xmlns:a="http://schemas.openxmlformats.org/drawingml/2006/main" xmlns:r="http://schemas.openxmlformats.org/officeDocument/2006/relationships" xmlns:p1510="http://schemas.microsoft.com/office/powerpoint/2015/10/main"/>
+</file>
+
 <file path=ppt/slideLayouts/slideLayout1.xml><?xml version="1.0" encoding="utf-8"?>
 <p:sldLayout xmlns:a="http://schemas.openxmlformats.org/drawingml/2006/main" xmlns:r="http://schemas.openxmlformats.org/officeDocument/2006/relationships" xmlns:p="http://schemas.openxmlformats.org/presentationml/2006/main" type="title" preserve="1">
   <p:cSld name="Title Slide">
@@ -154,7 +158,7 @@
           </a:lstStyle>
           <a:p>
             <a:r>
-              <a:rPr lang="en-US" smtClean="0"/>
+              <a:rPr lang="en-US"/>
               <a:t>Click to edit Master title style</a:t>
             </a:r>
             <a:endParaRPr lang="en-US" dirty="0"/>
@@ -219,7 +223,7 @@
           </a:lstStyle>
           <a:p>
             <a:r>
-              <a:rPr lang="en-US" smtClean="0"/>
+              <a:rPr lang="en-US"/>
               <a:t>Click to edit Master subtitle style</a:t>
             </a:r>
             <a:endParaRPr lang="en-US" dirty="0"/>
@@ -243,7 +247,7 @@
           <a:p>
             <a:fld id="{00A5CD91-B80E-4D93-AA1A-3B67EAF1B994}" type="datetimeFigureOut">
               <a:rPr lang="en-US" smtClean="0"/>
-              <a:t>7/21/2017</a:t>
+              <a:t>7/22/2017</a:t>
             </a:fld>
             <a:endParaRPr lang="en-US"/>
           </a:p>
@@ -337,7 +341,7 @@
           <a:lstStyle/>
           <a:p>
             <a:r>
-              <a:rPr lang="en-US" smtClean="0"/>
+              <a:rPr lang="en-US"/>
               <a:t>Click to edit Master title style</a:t>
             </a:r>
             <a:endParaRPr lang="en-US" dirty="0"/>
@@ -361,35 +365,35 @@
           <a:p>
             <a:pPr lvl="0"/>
             <a:r>
-              <a:rPr lang="en-US" smtClean="0"/>
+              <a:rPr lang="en-US"/>
               <a:t>Edit Master text styles</a:t>
             </a:r>
           </a:p>
           <a:p>
             <a:pPr lvl="1"/>
             <a:r>
-              <a:rPr lang="en-US" smtClean="0"/>
+              <a:rPr lang="en-US"/>
               <a:t>Second level</a:t>
             </a:r>
           </a:p>
           <a:p>
             <a:pPr lvl="2"/>
             <a:r>
-              <a:rPr lang="en-US" smtClean="0"/>
+              <a:rPr lang="en-US"/>
               <a:t>Third level</a:t>
             </a:r>
           </a:p>
           <a:p>
             <a:pPr lvl="3"/>
             <a:r>
-              <a:rPr lang="en-US" smtClean="0"/>
+              <a:rPr lang="en-US"/>
               <a:t>Fourth level</a:t>
             </a:r>
           </a:p>
           <a:p>
             <a:pPr lvl="4"/>
             <a:r>
-              <a:rPr lang="en-US" smtClean="0"/>
+              <a:rPr lang="en-US"/>
               <a:t>Fifth level</a:t>
             </a:r>
             <a:endParaRPr lang="en-US" dirty="0"/>
@@ -413,7 +417,7 @@
           <a:p>
             <a:fld id="{00A5CD91-B80E-4D93-AA1A-3B67EAF1B994}" type="datetimeFigureOut">
               <a:rPr lang="en-US" smtClean="0"/>
-              <a:t>7/21/2017</a:t>
+              <a:t>7/22/2017</a:t>
             </a:fld>
             <a:endParaRPr lang="en-US"/>
           </a:p>
@@ -512,7 +516,7 @@
           <a:lstStyle/>
           <a:p>
             <a:r>
-              <a:rPr lang="en-US" smtClean="0"/>
+              <a:rPr lang="en-US"/>
               <a:t>Click to edit Master title style</a:t>
             </a:r>
             <a:endParaRPr lang="en-US" dirty="0"/>
@@ -541,35 +545,35 @@
           <a:p>
             <a:pPr lvl="0"/>
             <a:r>
-              <a:rPr lang="en-US" smtClean="0"/>
+              <a:rPr lang="en-US"/>
               <a:t>Edit Master text styles</a:t>
             </a:r>
           </a:p>
           <a:p>
             <a:pPr lvl="1"/>
             <a:r>
-              <a:rPr lang="en-US" smtClean="0"/>
+              <a:rPr lang="en-US"/>
               <a:t>Second level</a:t>
             </a:r>
           </a:p>
           <a:p>
             <a:pPr lvl="2"/>
             <a:r>
-              <a:rPr lang="en-US" smtClean="0"/>
+              <a:rPr lang="en-US"/>
               <a:t>Third level</a:t>
             </a:r>
           </a:p>
           <a:p>
             <a:pPr lvl="3"/>
             <a:r>
-              <a:rPr lang="en-US" smtClean="0"/>
+              <a:rPr lang="en-US"/>
               <a:t>Fourth level</a:t>
             </a:r>
           </a:p>
           <a:p>
             <a:pPr lvl="4"/>
             <a:r>
-              <a:rPr lang="en-US" smtClean="0"/>
+              <a:rPr lang="en-US"/>
               <a:t>Fifth level</a:t>
             </a:r>
             <a:endParaRPr lang="en-US" dirty="0"/>
@@ -593,7 +597,7 @@
           <a:p>
             <a:fld id="{00A5CD91-B80E-4D93-AA1A-3B67EAF1B994}" type="datetimeFigureOut">
               <a:rPr lang="en-US" smtClean="0"/>
-              <a:t>7/21/2017</a:t>
+              <a:t>7/22/2017</a:t>
             </a:fld>
             <a:endParaRPr lang="en-US"/>
           </a:p>
@@ -687,7 +691,7 @@
           <a:lstStyle/>
           <a:p>
             <a:r>
-              <a:rPr lang="en-US" smtClean="0"/>
+              <a:rPr lang="en-US"/>
               <a:t>Click to edit Master title style</a:t>
             </a:r>
             <a:endParaRPr lang="en-US" dirty="0"/>
@@ -711,35 +715,35 @@
           <a:p>
             <a:pPr lvl="0"/>
             <a:r>
-              <a:rPr lang="en-US" smtClean="0"/>
+              <a:rPr lang="en-US"/>
               <a:t>Edit Master text styles</a:t>
             </a:r>
           </a:p>
           <a:p>
             <a:pPr lvl="1"/>
             <a:r>
-              <a:rPr lang="en-US" smtClean="0"/>
+              <a:rPr lang="en-US"/>
               <a:t>Second level</a:t>
             </a:r>
           </a:p>
           <a:p>
             <a:pPr lvl="2"/>
             <a:r>
-              <a:rPr lang="en-US" smtClean="0"/>
+              <a:rPr lang="en-US"/>
               <a:t>Third level</a:t>
             </a:r>
           </a:p>
           <a:p>
             <a:pPr lvl="3"/>
             <a:r>
-              <a:rPr lang="en-US" smtClean="0"/>
+              <a:rPr lang="en-US"/>
               <a:t>Fourth level</a:t>
             </a:r>
           </a:p>
           <a:p>
             <a:pPr lvl="4"/>
             <a:r>
-              <a:rPr lang="en-US" smtClean="0"/>
+              <a:rPr lang="en-US"/>
               <a:t>Fifth level</a:t>
             </a:r>
             <a:endParaRPr lang="en-US" dirty="0"/>
@@ -763,7 +767,7 @@
           <a:p>
             <a:fld id="{00A5CD91-B80E-4D93-AA1A-3B67EAF1B994}" type="datetimeFigureOut">
               <a:rPr lang="en-US" smtClean="0"/>
-              <a:t>7/21/2017</a:t>
+              <a:t>7/22/2017</a:t>
             </a:fld>
             <a:endParaRPr lang="en-US"/>
           </a:p>
@@ -866,7 +870,7 @@
           </a:lstStyle>
           <a:p>
             <a:r>
-              <a:rPr lang="en-US" smtClean="0"/>
+              <a:rPr lang="en-US"/>
               <a:t>Click to edit Master title style</a:t>
             </a:r>
             <a:endParaRPr lang="en-US" dirty="0"/>
@@ -984,7 +988,7 @@
           <a:p>
             <a:pPr lvl="0"/>
             <a:r>
-              <a:rPr lang="en-US" smtClean="0"/>
+              <a:rPr lang="en-US"/>
               <a:t>Edit Master text styles</a:t>
             </a:r>
           </a:p>
@@ -1007,7 +1011,7 @@
           <a:p>
             <a:fld id="{00A5CD91-B80E-4D93-AA1A-3B67EAF1B994}" type="datetimeFigureOut">
               <a:rPr lang="en-US" smtClean="0"/>
-              <a:t>7/21/2017</a:t>
+              <a:t>7/22/2017</a:t>
             </a:fld>
             <a:endParaRPr lang="en-US"/>
           </a:p>
@@ -1101,7 +1105,7 @@
           <a:lstStyle/>
           <a:p>
             <a:r>
-              <a:rPr lang="en-US" smtClean="0"/>
+              <a:rPr lang="en-US"/>
               <a:t>Click to edit Master title style</a:t>
             </a:r>
             <a:endParaRPr lang="en-US" dirty="0"/>
@@ -1130,35 +1134,35 @@
           <a:p>
             <a:pPr lvl="0"/>
             <a:r>
-              <a:rPr lang="en-US" smtClean="0"/>
+              <a:rPr lang="en-US"/>
               <a:t>Edit Master text styles</a:t>
             </a:r>
           </a:p>
           <a:p>
             <a:pPr lvl="1"/>
             <a:r>
-              <a:rPr lang="en-US" smtClean="0"/>
+              <a:rPr lang="en-US"/>
               <a:t>Second level</a:t>
             </a:r>
           </a:p>
           <a:p>
             <a:pPr lvl="2"/>
             <a:r>
-              <a:rPr lang="en-US" smtClean="0"/>
+              <a:rPr lang="en-US"/>
               <a:t>Third level</a:t>
             </a:r>
           </a:p>
           <a:p>
             <a:pPr lvl="3"/>
             <a:r>
-              <a:rPr lang="en-US" smtClean="0"/>
+              <a:rPr lang="en-US"/>
               <a:t>Fourth level</a:t>
             </a:r>
           </a:p>
           <a:p>
             <a:pPr lvl="4"/>
             <a:r>
-              <a:rPr lang="en-US" smtClean="0"/>
+              <a:rPr lang="en-US"/>
               <a:t>Fifth level</a:t>
             </a:r>
             <a:endParaRPr lang="en-US" dirty="0"/>
@@ -1187,35 +1191,35 @@
           <a:p>
             <a:pPr lvl="0"/>
             <a:r>
-              <a:rPr lang="en-US" smtClean="0"/>
+              <a:rPr lang="en-US"/>
               <a:t>Edit Master text styles</a:t>
             </a:r>
           </a:p>
           <a:p>
             <a:pPr lvl="1"/>
             <a:r>
-              <a:rPr lang="en-US" smtClean="0"/>
+              <a:rPr lang="en-US"/>
               <a:t>Second level</a:t>
             </a:r>
           </a:p>
           <a:p>
             <a:pPr lvl="2"/>
             <a:r>
-              <a:rPr lang="en-US" smtClean="0"/>
+              <a:rPr lang="en-US"/>
               <a:t>Third level</a:t>
             </a:r>
           </a:p>
           <a:p>
             <a:pPr lvl="3"/>
             <a:r>
-              <a:rPr lang="en-US" smtClean="0"/>
+              <a:rPr lang="en-US"/>
               <a:t>Fourth level</a:t>
             </a:r>
           </a:p>
           <a:p>
             <a:pPr lvl="4"/>
             <a:r>
-              <a:rPr lang="en-US" smtClean="0"/>
+              <a:rPr lang="en-US"/>
               <a:t>Fifth level</a:t>
             </a:r>
             <a:endParaRPr lang="en-US" dirty="0"/>
@@ -1239,7 +1243,7 @@
           <a:p>
             <a:fld id="{00A5CD91-B80E-4D93-AA1A-3B67EAF1B994}" type="datetimeFigureOut">
               <a:rPr lang="en-US" smtClean="0"/>
-              <a:t>7/21/2017</a:t>
+              <a:t>7/22/2017</a:t>
             </a:fld>
             <a:endParaRPr lang="en-US"/>
           </a:p>
@@ -1338,7 +1342,7 @@
           <a:lstStyle/>
           <a:p>
             <a:r>
-              <a:rPr lang="en-US" smtClean="0"/>
+              <a:rPr lang="en-US"/>
               <a:t>Click to edit Master title style</a:t>
             </a:r>
             <a:endParaRPr lang="en-US" dirty="0"/>
@@ -1404,7 +1408,7 @@
           <a:p>
             <a:pPr lvl="0"/>
             <a:r>
-              <a:rPr lang="en-US" smtClean="0"/>
+              <a:rPr lang="en-US"/>
               <a:t>Edit Master text styles</a:t>
             </a:r>
           </a:p>
@@ -1432,35 +1436,35 @@
           <a:p>
             <a:pPr lvl="0"/>
             <a:r>
-              <a:rPr lang="en-US" smtClean="0"/>
+              <a:rPr lang="en-US"/>
               <a:t>Edit Master text styles</a:t>
             </a:r>
           </a:p>
           <a:p>
             <a:pPr lvl="1"/>
             <a:r>
-              <a:rPr lang="en-US" smtClean="0"/>
+              <a:rPr lang="en-US"/>
               <a:t>Second level</a:t>
             </a:r>
           </a:p>
           <a:p>
             <a:pPr lvl="2"/>
             <a:r>
-              <a:rPr lang="en-US" smtClean="0"/>
+              <a:rPr lang="en-US"/>
               <a:t>Third level</a:t>
             </a:r>
           </a:p>
           <a:p>
             <a:pPr lvl="3"/>
             <a:r>
-              <a:rPr lang="en-US" smtClean="0"/>
+              <a:rPr lang="en-US"/>
               <a:t>Fourth level</a:t>
             </a:r>
           </a:p>
           <a:p>
             <a:pPr lvl="4"/>
             <a:r>
-              <a:rPr lang="en-US" smtClean="0"/>
+              <a:rPr lang="en-US"/>
               <a:t>Fifth level</a:t>
             </a:r>
             <a:endParaRPr lang="en-US" dirty="0"/>
@@ -1526,7 +1530,7 @@
           <a:p>
             <a:pPr lvl="0"/>
             <a:r>
-              <a:rPr lang="en-US" smtClean="0"/>
+              <a:rPr lang="en-US"/>
               <a:t>Edit Master text styles</a:t>
             </a:r>
           </a:p>
@@ -1554,35 +1558,35 @@
           <a:p>
             <a:pPr lvl="0"/>
             <a:r>
-              <a:rPr lang="en-US" smtClean="0"/>
+              <a:rPr lang="en-US"/>
               <a:t>Edit Master text styles</a:t>
             </a:r>
           </a:p>
           <a:p>
             <a:pPr lvl="1"/>
             <a:r>
-              <a:rPr lang="en-US" smtClean="0"/>
+              <a:rPr lang="en-US"/>
               <a:t>Second level</a:t>
             </a:r>
           </a:p>
           <a:p>
             <a:pPr lvl="2"/>
             <a:r>
-              <a:rPr lang="en-US" smtClean="0"/>
+              <a:rPr lang="en-US"/>
               <a:t>Third level</a:t>
             </a:r>
           </a:p>
           <a:p>
             <a:pPr lvl="3"/>
             <a:r>
-              <a:rPr lang="en-US" smtClean="0"/>
+              <a:rPr lang="en-US"/>
               <a:t>Fourth level</a:t>
             </a:r>
           </a:p>
           <a:p>
             <a:pPr lvl="4"/>
             <a:r>
-              <a:rPr lang="en-US" smtClean="0"/>
+              <a:rPr lang="en-US"/>
               <a:t>Fifth level</a:t>
             </a:r>
             <a:endParaRPr lang="en-US" dirty="0"/>
@@ -1606,7 +1610,7 @@
           <a:p>
             <a:fld id="{00A5CD91-B80E-4D93-AA1A-3B67EAF1B994}" type="datetimeFigureOut">
               <a:rPr lang="en-US" smtClean="0"/>
-              <a:t>7/21/2017</a:t>
+              <a:t>7/22/2017</a:t>
             </a:fld>
             <a:endParaRPr lang="en-US"/>
           </a:p>
@@ -1700,7 +1704,7 @@
           <a:lstStyle/>
           <a:p>
             <a:r>
-              <a:rPr lang="en-US" smtClean="0"/>
+              <a:rPr lang="en-US"/>
               <a:t>Click to edit Master title style</a:t>
             </a:r>
             <a:endParaRPr lang="en-US" dirty="0"/>
@@ -1724,7 +1728,7 @@
           <a:p>
             <a:fld id="{00A5CD91-B80E-4D93-AA1A-3B67EAF1B994}" type="datetimeFigureOut">
               <a:rPr lang="en-US" smtClean="0"/>
-              <a:t>7/21/2017</a:t>
+              <a:t>7/22/2017</a:t>
             </a:fld>
             <a:endParaRPr lang="en-US"/>
           </a:p>
@@ -1819,7 +1823,7 @@
           <a:p>
             <a:fld id="{00A5CD91-B80E-4D93-AA1A-3B67EAF1B994}" type="datetimeFigureOut">
               <a:rPr lang="en-US" smtClean="0"/>
-              <a:t>7/21/2017</a:t>
+              <a:t>7/22/2017</a:t>
             </a:fld>
             <a:endParaRPr lang="en-US"/>
           </a:p>
@@ -1922,7 +1926,7 @@
           </a:lstStyle>
           <a:p>
             <a:r>
-              <a:rPr lang="en-US" smtClean="0"/>
+              <a:rPr lang="en-US"/>
               <a:t>Click to edit Master title style</a:t>
             </a:r>
             <a:endParaRPr lang="en-US" dirty="0"/>
@@ -1979,35 +1983,35 @@
           <a:p>
             <a:pPr lvl="0"/>
             <a:r>
-              <a:rPr lang="en-US" smtClean="0"/>
+              <a:rPr lang="en-US"/>
               <a:t>Edit Master text styles</a:t>
             </a:r>
           </a:p>
           <a:p>
             <a:pPr lvl="1"/>
             <a:r>
-              <a:rPr lang="en-US" smtClean="0"/>
+              <a:rPr lang="en-US"/>
               <a:t>Second level</a:t>
             </a:r>
           </a:p>
           <a:p>
             <a:pPr lvl="2"/>
             <a:r>
-              <a:rPr lang="en-US" smtClean="0"/>
+              <a:rPr lang="en-US"/>
               <a:t>Third level</a:t>
             </a:r>
           </a:p>
           <a:p>
             <a:pPr lvl="3"/>
             <a:r>
-              <a:rPr lang="en-US" smtClean="0"/>
+              <a:rPr lang="en-US"/>
               <a:t>Fourth level</a:t>
             </a:r>
           </a:p>
           <a:p>
             <a:pPr lvl="4"/>
             <a:r>
-              <a:rPr lang="en-US" smtClean="0"/>
+              <a:rPr lang="en-US"/>
               <a:t>Fifth level</a:t>
             </a:r>
             <a:endParaRPr lang="en-US" dirty="0"/>
@@ -2073,7 +2077,7 @@
           <a:p>
             <a:pPr lvl="0"/>
             <a:r>
-              <a:rPr lang="en-US" smtClean="0"/>
+              <a:rPr lang="en-US"/>
               <a:t>Edit Master text styles</a:t>
             </a:r>
           </a:p>
@@ -2096,7 +2100,7 @@
           <a:p>
             <a:fld id="{00A5CD91-B80E-4D93-AA1A-3B67EAF1B994}" type="datetimeFigureOut">
               <a:rPr lang="en-US" smtClean="0"/>
-              <a:t>7/21/2017</a:t>
+              <a:t>7/22/2017</a:t>
             </a:fld>
             <a:endParaRPr lang="en-US"/>
           </a:p>
@@ -2199,7 +2203,7 @@
           </a:lstStyle>
           <a:p>
             <a:r>
-              <a:rPr lang="en-US" smtClean="0"/>
+              <a:rPr lang="en-US"/>
               <a:t>Click to edit Master title style</a:t>
             </a:r>
             <a:endParaRPr lang="en-US" dirty="0"/>
@@ -2264,7 +2268,7 @@
           </a:lstStyle>
           <a:p>
             <a:r>
-              <a:rPr lang="en-US" smtClean="0"/>
+              <a:rPr lang="en-US"/>
               <a:t>Click icon to add picture</a:t>
             </a:r>
             <a:endParaRPr lang="en-US" dirty="0"/>
@@ -2330,7 +2334,7 @@
           <a:p>
             <a:pPr lvl="0"/>
             <a:r>
-              <a:rPr lang="en-US" smtClean="0"/>
+              <a:rPr lang="en-US"/>
               <a:t>Edit Master text styles</a:t>
             </a:r>
           </a:p>
@@ -2353,7 +2357,7 @@
           <a:p>
             <a:fld id="{00A5CD91-B80E-4D93-AA1A-3B67EAF1B994}" type="datetimeFigureOut">
               <a:rPr lang="en-US" smtClean="0"/>
-              <a:t>7/21/2017</a:t>
+              <a:t>7/22/2017</a:t>
             </a:fld>
             <a:endParaRPr lang="en-US"/>
           </a:p>
@@ -2462,7 +2466,7 @@
           <a:lstStyle/>
           <a:p>
             <a:r>
-              <a:rPr lang="en-US" smtClean="0"/>
+              <a:rPr lang="en-US"/>
               <a:t>Click to edit Master title style</a:t>
             </a:r>
             <a:endParaRPr lang="en-US" dirty="0"/>
@@ -2496,35 +2500,35 @@
           <a:p>
             <a:pPr lvl="0"/>
             <a:r>
-              <a:rPr lang="en-US" smtClean="0"/>
+              <a:rPr lang="en-US"/>
               <a:t>Edit Master text styles</a:t>
             </a:r>
           </a:p>
           <a:p>
             <a:pPr lvl="1"/>
             <a:r>
-              <a:rPr lang="en-US" smtClean="0"/>
+              <a:rPr lang="en-US"/>
               <a:t>Second level</a:t>
             </a:r>
           </a:p>
           <a:p>
             <a:pPr lvl="2"/>
             <a:r>
-              <a:rPr lang="en-US" smtClean="0"/>
+              <a:rPr lang="en-US"/>
               <a:t>Third level</a:t>
             </a:r>
           </a:p>
           <a:p>
             <a:pPr lvl="3"/>
             <a:r>
-              <a:rPr lang="en-US" smtClean="0"/>
+              <a:rPr lang="en-US"/>
               <a:t>Fourth level</a:t>
             </a:r>
           </a:p>
           <a:p>
             <a:pPr lvl="4"/>
             <a:r>
-              <a:rPr lang="en-US" smtClean="0"/>
+              <a:rPr lang="en-US"/>
               <a:t>Fifth level</a:t>
             </a:r>
             <a:endParaRPr lang="en-US" dirty="0"/>
@@ -2566,7 +2570,7 @@
           <a:p>
             <a:fld id="{00A5CD91-B80E-4D93-AA1A-3B67EAF1B994}" type="datetimeFigureOut">
               <a:rPr lang="en-US" smtClean="0"/>
-              <a:t>7/21/2017</a:t>
+              <a:t>7/22/2017</a:t>
             </a:fld>
             <a:endParaRPr lang="en-US"/>
           </a:p>
@@ -3036,10 +3040,9 @@
           <a:p>
             <a:pPr algn="ctr"/>
             <a:r>
-              <a:rPr lang="en-US" sz="7200" b="1" dirty="0" smtClean="0"/>
+              <a:rPr lang="en-US" sz="7200" b="1" dirty="0"/>
               <a:t>Architecture for An Indoor Distributed Cyber-Physical System Composed of Mobile Robots and Fog Computing Nodes</a:t>
             </a:r>
-            <a:endParaRPr lang="en-US" sz="7200" b="1" dirty="0"/>
           </a:p>
         </p:txBody>
       </p:sp>
@@ -3066,7 +3069,7 @@
           <a:lstStyle/>
           <a:p>
             <a:r>
-              <a:rPr lang="en-US" sz="4000" b="1" dirty="0" smtClean="0">
+              <a:rPr lang="en-US" sz="4000" b="1" dirty="0">
                 <a:solidFill>
                   <a:schemeClr val="tx2"/>
                 </a:solidFill>
@@ -3077,21 +3080,16 @@
           <a:p>
             <a:r>
               <a:rPr lang="en-US" sz="3600" dirty="0"/>
-              <a:t>D</a:t>
-            </a:r>
-            <a:r>
-              <a:rPr lang="en-US" sz="3600" dirty="0" smtClean="0"/>
-              <a:t>evelop an architecture for providing localization information to robots using StarL across the view of multiple Kinect cameras connected to x86 </a:t>
-            </a:r>
-            <a:r>
-              <a:rPr lang="en-US" sz="3600" dirty="0" err="1" smtClean="0"/>
+              <a:t>Develop an architecture for providing localization information to robots using StarL across the view of multiple Kinect cameras connected to x86 </a:t>
+            </a:r>
+            <a:r>
+              <a:rPr lang="en-US" sz="3600" dirty="0" err="1"/>
               <a:t>MinnowBoards</a:t>
             </a:r>
             <a:r>
-              <a:rPr lang="en-US" sz="3600" dirty="0" smtClean="0"/>
+              <a:rPr lang="en-US" sz="3600" dirty="0"/>
               <a:t> in a Fog Computing fashion</a:t>
             </a:r>
-            <a:endParaRPr lang="en-US" sz="3600" dirty="0"/>
           </a:p>
         </p:txBody>
       </p:sp>
@@ -3103,7 +3101,7 @@
         </p:nvSpPr>
         <p:spPr>
           <a:xfrm>
-            <a:off x="20292140" y="19160763"/>
+            <a:off x="20069878" y="18042312"/>
             <a:ext cx="8425733" cy="1815882"/>
           </a:xfrm>
           <a:prstGeom prst="rect">
@@ -3118,7 +3116,7 @@
           <a:lstStyle/>
           <a:p>
             <a:r>
-              <a:rPr lang="en-US" sz="4000" b="1" dirty="0" smtClean="0">
+              <a:rPr lang="en-US" sz="4000" b="1" dirty="0">
                 <a:solidFill>
                   <a:schemeClr val="tx2"/>
                 </a:solidFill>
@@ -3128,7 +3126,7 @@
           </a:p>
           <a:p>
             <a:r>
-              <a:rPr lang="en-US" sz="3600" dirty="0" smtClean="0"/>
+              <a:rPr lang="en-US" sz="3600" dirty="0"/>
               <a:t>Nathan’s Thesis</a:t>
             </a:r>
           </a:p>
@@ -3160,7 +3158,7 @@
           <a:lstStyle/>
           <a:p>
             <a:r>
-              <a:rPr lang="en-US" sz="4000" b="1" dirty="0" smtClean="0">
+              <a:rPr lang="en-US" sz="4000" b="1" dirty="0">
                 <a:solidFill>
                   <a:schemeClr val="tx2"/>
                 </a:solidFill>
@@ -3174,7 +3172,7 @@
               <a:buChar char="•"/>
             </a:pPr>
             <a:r>
-              <a:rPr lang="en-US" sz="3600" dirty="0" smtClean="0"/>
+              <a:rPr lang="en-US" sz="3600" dirty="0"/>
               <a:t>2 types of ROS nodes: Central Command, and Robot Observer</a:t>
             </a:r>
           </a:p>
@@ -3184,7 +3182,7 @@
               <a:buChar char="•"/>
             </a:pPr>
             <a:r>
-              <a:rPr lang="en-US" sz="3600" dirty="0" smtClean="0"/>
+              <a:rPr lang="en-US" sz="3600" dirty="0"/>
               <a:t>Central Command records position information and informs each Robot Observer node which drones to look for</a:t>
             </a:r>
           </a:p>
@@ -3194,10 +3192,9 @@
               <a:buChar char="•"/>
             </a:pPr>
             <a:r>
-              <a:rPr lang="en-US" sz="3600" dirty="0" smtClean="0"/>
+              <a:rPr lang="en-US" sz="3600" dirty="0"/>
               <a:t>Robot Observer nodes process the Kinect image and report location information to the Central Command node</a:t>
             </a:r>
-            <a:endParaRPr lang="en-US" sz="3600" dirty="0"/>
           </a:p>
         </p:txBody>
       </p:sp>
@@ -3209,7 +3206,7 @@
         </p:nvSpPr>
         <p:spPr>
           <a:xfrm>
-            <a:off x="20292142" y="4464502"/>
+            <a:off x="20069880" y="12389752"/>
             <a:ext cx="8425733" cy="3477875"/>
           </a:xfrm>
           <a:prstGeom prst="rect">
@@ -3224,7 +3221,7 @@
           <a:lstStyle/>
           <a:p>
             <a:r>
-              <a:rPr lang="en-US" sz="4000" b="1" dirty="0" smtClean="0">
+              <a:rPr lang="en-US" sz="4000" b="1" dirty="0">
                 <a:solidFill>
                   <a:schemeClr val="tx2"/>
                 </a:solidFill>
@@ -3238,7 +3235,7 @@
               <a:buChar char="•"/>
             </a:pPr>
             <a:r>
-              <a:rPr lang="en-US" sz="3600" dirty="0" smtClean="0"/>
+              <a:rPr lang="en-US" sz="3600" dirty="0"/>
               <a:t>Finish writing code</a:t>
             </a:r>
           </a:p>
@@ -3248,14 +3245,14 @@
               <a:buChar char="•"/>
             </a:pPr>
             <a:r>
-              <a:rPr lang="en-US" sz="3600" dirty="0" smtClean="0"/>
+              <a:rPr lang="en-US" sz="3600" dirty="0"/>
               <a:t>Fix issues between Kinect and </a:t>
             </a:r>
             <a:r>
-              <a:rPr lang="en-US" sz="3600" dirty="0" err="1" smtClean="0"/>
+              <a:rPr lang="en-US" sz="3600" dirty="0" err="1"/>
               <a:t>MinnowBoard</a:t>
             </a:r>
-            <a:endParaRPr lang="en-US" sz="3600" dirty="0" smtClean="0"/>
+            <a:endParaRPr lang="en-US" sz="3600" dirty="0"/>
           </a:p>
           <a:p>
             <a:pPr marL="571500" indent="-571500">
@@ -3263,7 +3260,7 @@
               <a:buChar char="•"/>
             </a:pPr>
             <a:r>
-              <a:rPr lang="en-US" sz="3600" dirty="0" smtClean="0"/>
+              <a:rPr lang="en-US" sz="3600" dirty="0"/>
               <a:t>Validate system design</a:t>
             </a:r>
           </a:p>
@@ -3273,10 +3270,9 @@
               <a:buChar char="•"/>
             </a:pPr>
             <a:r>
-              <a:rPr lang="en-US" sz="3600" dirty="0" smtClean="0"/>
+              <a:rPr lang="en-US" sz="3600" dirty="0"/>
               <a:t>Add more drone types to the system</a:t>
             </a:r>
-            <a:endParaRPr lang="en-US" sz="3600" dirty="0"/>
           </a:p>
         </p:txBody>
       </p:sp>
@@ -3333,7 +3329,7 @@
           <a:lstStyle/>
           <a:p>
             <a:r>
-              <a:rPr lang="en-US" sz="4000" b="1" dirty="0" smtClean="0">
+              <a:rPr lang="en-US" sz="4000" b="1" dirty="0">
                 <a:solidFill>
                   <a:schemeClr val="tx2"/>
                 </a:solidFill>
@@ -3343,10 +3339,9 @@
           </a:p>
           <a:p>
             <a:r>
-              <a:rPr lang="en-US" sz="3600" dirty="0" smtClean="0"/>
+              <a:rPr lang="en-US" sz="3600" dirty="0"/>
               <a:t>The current system uses a single Kinect camera which limits the total field of view. By adding more Kinect cameras, the area covered by the localization method is expanded so tests can be run across a larger area. Additionally, the architecture could be used for other, similar distributed systems</a:t>
             </a:r>
-            <a:endParaRPr lang="en-US" sz="3600" dirty="0"/>
           </a:p>
         </p:txBody>
       </p:sp>
@@ -3373,10 +3368,9 @@
           <a:lstStyle/>
           <a:p>
             <a:r>
-              <a:rPr lang="en-US" sz="3400" dirty="0" smtClean="0"/>
+              <a:rPr lang="en-US" sz="3400" dirty="0"/>
               <a:t>Nathaniel Paul Hamilton ● PhD Student at Vanderbilt University, Electrical Engineering ● nathaniel.p.hamilton@vanderbilt.edu ● Advisor: Dr. Taylor Johnson</a:t>
             </a:r>
-            <a:endParaRPr lang="en-US" sz="3400" dirty="0"/>
           </a:p>
         </p:txBody>
       </p:sp>
@@ -3388,7 +3382,7 @@
         </p:nvSpPr>
         <p:spPr>
           <a:xfrm>
-            <a:off x="20292141" y="15413999"/>
+            <a:off x="20069879" y="15867627"/>
             <a:ext cx="8425733" cy="1261884"/>
           </a:xfrm>
           <a:prstGeom prst="rect">
@@ -3403,7 +3397,7 @@
           <a:lstStyle/>
           <a:p>
             <a:r>
-              <a:rPr lang="en-US" sz="4000" b="1" dirty="0" smtClean="0">
+              <a:rPr lang="en-US" sz="4000" b="1" dirty="0">
                 <a:solidFill>
                   <a:schemeClr val="tx2"/>
                 </a:solidFill>
@@ -3413,10 +3407,9 @@
           </a:p>
           <a:p>
             <a:r>
-              <a:rPr lang="en-US" sz="3600" dirty="0" smtClean="0"/>
+              <a:rPr lang="en-US" sz="3600" dirty="0"/>
               <a:t>I am not sure what to put here</a:t>
             </a:r>
-            <a:endParaRPr lang="en-US" sz="3600" dirty="0"/>
           </a:p>
         </p:txBody>
       </p:sp>
@@ -3457,7 +3450,7 @@
             <a:lstStyle/>
             <a:p>
               <a:r>
-                <a:rPr lang="en-US" sz="4000" b="1" dirty="0" smtClean="0">
+                <a:rPr lang="en-US" sz="4000" b="1" dirty="0">
                   <a:solidFill>
                     <a:schemeClr val="tx2"/>
                   </a:solidFill>
@@ -3465,7 +3458,7 @@
                 <a:t>Current Setup </a:t>
               </a:r>
               <a:r>
-                <a:rPr lang="en-US" b="1" dirty="0" smtClean="0">
+                <a:rPr lang="en-US" b="1" dirty="0">
                   <a:solidFill>
                     <a:schemeClr val="tx2"/>
                   </a:solidFill>
@@ -3543,7 +3536,7 @@
             <a:lstStyle/>
             <a:p>
               <a:r>
-                <a:rPr lang="en-US" sz="4000" b="1" dirty="0" smtClean="0">
+                <a:rPr lang="en-US" sz="4000" b="1" dirty="0">
                   <a:solidFill>
                     <a:schemeClr val="tx2"/>
                   </a:solidFill>
@@ -3586,21 +3579,66 @@
       </p:grpSp>
       <p:grpSp>
         <p:nvGrpSpPr>
-          <p:cNvPr id="27" name="Group 26"/>
+          <p:cNvPr id="29" name="Group 28">
+            <a:extLst>
+              <a:ext uri="{FF2B5EF4-FFF2-40B4-BE49-F238E27FC236}">
+                <a16:creationId xmlns:a16="http://schemas.microsoft.com/office/drawing/2014/main" id="{98F69834-D800-4BA6-A0E2-7B802817AFAA}"/>
+              </a:ext>
+            </a:extLst>
+          </p:cNvPr>
           <p:cNvGrpSpPr/>
           <p:nvPr/>
         </p:nvGrpSpPr>
         <p:grpSpPr>
           <a:xfrm>
-            <a:off x="11227229" y="9830970"/>
-            <a:ext cx="9064911" cy="5027703"/>
-            <a:chOff x="11153568" y="10178472"/>
-            <a:chExt cx="9064911" cy="5027703"/>
+            <a:off x="11067287" y="13703271"/>
+            <a:ext cx="9115395" cy="4851623"/>
+            <a:chOff x="11176745" y="9833440"/>
+            <a:chExt cx="9115395" cy="4851623"/>
           </a:xfrm>
         </p:grpSpPr>
+        <p:sp>
+          <p:nvSpPr>
+            <p:cNvPr id="25" name="TextBox 24"/>
+            <p:cNvSpPr txBox="1"/>
+            <p:nvPr/>
+          </p:nvSpPr>
+          <p:spPr>
+            <a:xfrm>
+              <a:off x="11227229" y="9833440"/>
+              <a:ext cx="9064911" cy="707886"/>
+            </a:xfrm>
+            <a:prstGeom prst="rect">
+              <a:avLst/>
+            </a:prstGeom>
+            <a:noFill/>
+          </p:spPr>
+          <p:txBody>
+            <a:bodyPr wrap="square" rtlCol="0">
+              <a:spAutoFit/>
+            </a:bodyPr>
+            <a:lstStyle/>
+            <a:p>
+              <a:r>
+                <a:rPr lang="en-US" sz="4000" b="1" dirty="0">
+                  <a:solidFill>
+                    <a:schemeClr val="tx2"/>
+                  </a:solidFill>
+                </a:rPr>
+                <a:t>Central Command Code Schematic</a:t>
+              </a:r>
+            </a:p>
+          </p:txBody>
+        </p:sp>
         <p:pic>
           <p:nvPicPr>
-            <p:cNvPr id="12" name="Picture 11"/>
+            <p:cNvPr id="14" name="Picture 13">
+              <a:extLst>
+                <a:ext uri="{FF2B5EF4-FFF2-40B4-BE49-F238E27FC236}">
+                  <a16:creationId xmlns:a16="http://schemas.microsoft.com/office/drawing/2014/main" id="{2B25BC34-367D-4210-83BE-8AD67D4C12AD}"/>
+                </a:ext>
+              </a:extLst>
+            </p:cNvPr>
             <p:cNvPicPr>
               <a:picLocks noChangeAspect="1"/>
             </p:cNvPicPr>
@@ -3620,60 +3658,33 @@
           </p:blipFill>
           <p:spPr>
             <a:xfrm>
-              <a:off x="11176745" y="10817948"/>
-              <a:ext cx="8896469" cy="4388227"/>
+              <a:off x="11176745" y="10553176"/>
+              <a:ext cx="8893135" cy="4131887"/>
             </a:xfrm>
             <a:prstGeom prst="rect">
               <a:avLst/>
             </a:prstGeom>
           </p:spPr>
         </p:pic>
-        <p:sp>
-          <p:nvSpPr>
-            <p:cNvPr id="25" name="TextBox 24"/>
-            <p:cNvSpPr txBox="1"/>
-            <p:nvPr/>
-          </p:nvSpPr>
-          <p:spPr>
-            <a:xfrm>
-              <a:off x="11153568" y="10178472"/>
-              <a:ext cx="9064911" cy="707886"/>
-            </a:xfrm>
-            <a:prstGeom prst="rect">
-              <a:avLst/>
-            </a:prstGeom>
-            <a:noFill/>
-          </p:spPr>
-          <p:txBody>
-            <a:bodyPr wrap="square" rtlCol="0">
-              <a:spAutoFit/>
-            </a:bodyPr>
-            <a:lstStyle/>
-            <a:p>
-              <a:r>
-                <a:rPr lang="en-US" sz="4000" b="1" dirty="0" smtClean="0">
-                  <a:solidFill>
-                    <a:schemeClr val="tx2"/>
-                  </a:solidFill>
-                </a:rPr>
-                <a:t>Central Command Code Schematic</a:t>
-              </a:r>
-            </a:p>
-          </p:txBody>
-        </p:sp>
       </p:grpSp>
       <p:grpSp>
         <p:nvGrpSpPr>
-          <p:cNvPr id="10" name="Group 9"/>
+          <p:cNvPr id="28" name="Group 27">
+            <a:extLst>
+              <a:ext uri="{FF2B5EF4-FFF2-40B4-BE49-F238E27FC236}">
+                <a16:creationId xmlns:a16="http://schemas.microsoft.com/office/drawing/2014/main" id="{2E1F2269-5CBF-4118-95FA-B2A794A8D966}"/>
+              </a:ext>
+            </a:extLst>
+          </p:cNvPr>
           <p:cNvGrpSpPr/>
           <p:nvPr/>
         </p:nvGrpSpPr>
         <p:grpSpPr>
           <a:xfrm>
-            <a:off x="11250406" y="15085839"/>
-            <a:ext cx="9064911" cy="7851348"/>
+            <a:off x="20069880" y="4489817"/>
+            <a:ext cx="9064911" cy="7532768"/>
             <a:chOff x="11250406" y="15085839"/>
-            <a:chExt cx="9064911" cy="7851348"/>
+            <a:chExt cx="9064911" cy="7532768"/>
           </a:xfrm>
         </p:grpSpPr>
         <p:sp>
@@ -3699,7 +3710,7 @@
             <a:lstStyle/>
             <a:p>
               <a:r>
-                <a:rPr lang="en-US" sz="4000" b="1" dirty="0" smtClean="0">
+                <a:rPr lang="en-US" sz="4000" b="1" dirty="0">
                   <a:solidFill>
                     <a:schemeClr val="tx2"/>
                   </a:solidFill>
@@ -3711,7 +3722,13 @@
         </p:sp>
         <p:pic>
           <p:nvPicPr>
-            <p:cNvPr id="3" name="Picture 2"/>
+            <p:cNvPr id="24" name="Picture 23">
+              <a:extLst>
+                <a:ext uri="{FF2B5EF4-FFF2-40B4-BE49-F238E27FC236}">
+                  <a16:creationId xmlns:a16="http://schemas.microsoft.com/office/drawing/2014/main" id="{01FD04AB-58D7-4EBE-BE5A-2AD308E4ADA8}"/>
+                </a:ext>
+              </a:extLst>
+            </p:cNvPr>
             <p:cNvPicPr>
               <a:picLocks noChangeAspect="1"/>
             </p:cNvPicPr>
@@ -3731,8 +3748,8 @@
           </p:blipFill>
           <p:spPr>
             <a:xfrm>
-              <a:off x="11488647" y="15646418"/>
-              <a:ext cx="7843100" cy="7290769"/>
+              <a:off x="12068174" y="15793725"/>
+              <a:ext cx="7118183" cy="6824882"/>
             </a:xfrm>
             <a:prstGeom prst="rect">
               <a:avLst/>
@@ -3740,6 +3757,236 @@
           </p:spPr>
         </p:pic>
       </p:grpSp>
+      <p:sp>
+        <p:nvSpPr>
+          <p:cNvPr id="30" name="TextBox 29">
+            <a:extLst>
+              <a:ext uri="{FF2B5EF4-FFF2-40B4-BE49-F238E27FC236}">
+                <a16:creationId xmlns:a16="http://schemas.microsoft.com/office/drawing/2014/main" id="{35282B1C-FE9E-46DA-89A6-075FE5BAC849}"/>
+              </a:ext>
+            </a:extLst>
+          </p:cNvPr>
+          <p:cNvSpPr txBox="1"/>
+          <p:nvPr/>
+        </p:nvSpPr>
+        <p:spPr>
+          <a:xfrm>
+            <a:off x="11176745" y="9756032"/>
+            <a:ext cx="8425733" cy="3785652"/>
+          </a:xfrm>
+          <a:prstGeom prst="rect">
+            <a:avLst/>
+          </a:prstGeom>
+          <a:noFill/>
+        </p:spPr>
+        <p:txBody>
+          <a:bodyPr wrap="square" rtlCol="0">
+            <a:spAutoFit/>
+          </a:bodyPr>
+          <a:lstStyle/>
+          <a:p>
+            <a:r>
+              <a:rPr lang="en-US" sz="4000" b="1" dirty="0">
+                <a:solidFill>
+                  <a:schemeClr val="tx2"/>
+                </a:solidFill>
+              </a:rPr>
+              <a:t>Central Command Subscription List</a:t>
+            </a:r>
+          </a:p>
+          <a:p>
+            <a:pPr marL="571500" indent="-571500">
+              <a:buFont typeface="Arial" panose="020B0604020202020204" pitchFamily="34" charset="0"/>
+              <a:buChar char="•"/>
+            </a:pPr>
+            <a:r>
+              <a:rPr lang="en-US" sz="3600" i="1" dirty="0"/>
+              <a:t>/</a:t>
+            </a:r>
+            <a:r>
+              <a:rPr lang="en-US" sz="3600" i="1" dirty="0" err="1"/>
+              <a:t>kinect</a:t>
+            </a:r>
+            <a:r>
+              <a:rPr lang="en-US" sz="3600" i="1" dirty="0"/>
+              <a:t>#/locations</a:t>
+            </a:r>
+          </a:p>
+          <a:p>
+            <a:pPr marL="1028700" lvl="1" indent="-571500">
+              <a:buFont typeface="Arial" panose="020B0604020202020204" pitchFamily="34" charset="0"/>
+              <a:buChar char="•"/>
+            </a:pPr>
+            <a:r>
+              <a:rPr lang="en-US" sz="3200" dirty="0"/>
+              <a:t>List of robot names and location information</a:t>
+            </a:r>
+          </a:p>
+          <a:p>
+            <a:pPr marL="571500" indent="-571500">
+              <a:buFont typeface="Arial" panose="020B0604020202020204" pitchFamily="34" charset="0"/>
+              <a:buChar char="•"/>
+            </a:pPr>
+            <a:r>
+              <a:rPr lang="en-US" sz="3600" i="1" dirty="0"/>
+              <a:t>/</a:t>
+            </a:r>
+            <a:r>
+              <a:rPr lang="en-US" sz="3600" i="1" dirty="0" err="1"/>
+              <a:t>kinect</a:t>
+            </a:r>
+            <a:r>
+              <a:rPr lang="en-US" sz="3600" i="1" dirty="0"/>
+              <a:t>#/response</a:t>
+            </a:r>
+          </a:p>
+          <a:p>
+            <a:pPr marL="1028700" lvl="1" indent="-571500">
+              <a:buFont typeface="Arial" panose="020B0604020202020204" pitchFamily="34" charset="0"/>
+              <a:buChar char="•"/>
+            </a:pPr>
+            <a:r>
+              <a:rPr lang="en-US" sz="3200" dirty="0"/>
+              <a:t>Report from indicating whether or not a robot was found crossing its boundaries</a:t>
+            </a:r>
+          </a:p>
+        </p:txBody>
+      </p:sp>
+      <p:sp>
+        <p:nvSpPr>
+          <p:cNvPr id="31" name="TextBox 30">
+            <a:extLst>
+              <a:ext uri="{FF2B5EF4-FFF2-40B4-BE49-F238E27FC236}">
+                <a16:creationId xmlns:a16="http://schemas.microsoft.com/office/drawing/2014/main" id="{ABC14D63-5DFD-48F0-9F4A-3790BD21CA2F}"/>
+              </a:ext>
+            </a:extLst>
+          </p:cNvPr>
+          <p:cNvSpPr txBox="1"/>
+          <p:nvPr/>
+        </p:nvSpPr>
+        <p:spPr>
+          <a:xfrm>
+            <a:off x="11176745" y="18777542"/>
+            <a:ext cx="8425733" cy="4462760"/>
+          </a:xfrm>
+          <a:prstGeom prst="rect">
+            <a:avLst/>
+          </a:prstGeom>
+          <a:noFill/>
+        </p:spPr>
+        <p:txBody>
+          <a:bodyPr wrap="square" rtlCol="0">
+            <a:spAutoFit/>
+          </a:bodyPr>
+          <a:lstStyle/>
+          <a:p>
+            <a:r>
+              <a:rPr lang="en-US" sz="4000" b="1" dirty="0">
+                <a:solidFill>
+                  <a:schemeClr val="tx2"/>
+                </a:solidFill>
+              </a:rPr>
+              <a:t>Robot Observer Subscription List</a:t>
+            </a:r>
+          </a:p>
+          <a:p>
+            <a:pPr marL="571500" indent="-571500">
+              <a:buFont typeface="Arial" panose="020B0604020202020204" pitchFamily="34" charset="0"/>
+              <a:buChar char="•"/>
+            </a:pPr>
+            <a:r>
+              <a:rPr lang="en-US" sz="3600" i="1" dirty="0"/>
+              <a:t>/</a:t>
+            </a:r>
+            <a:r>
+              <a:rPr lang="en-US" sz="3600" i="1" dirty="0" err="1"/>
+              <a:t>botID_list</a:t>
+            </a:r>
+            <a:endParaRPr lang="en-US" sz="3600" i="1" dirty="0"/>
+          </a:p>
+          <a:p>
+            <a:pPr marL="1028700" lvl="1" indent="-571500">
+              <a:buFont typeface="Arial" panose="020B0604020202020204" pitchFamily="34" charset="0"/>
+              <a:buChar char="•"/>
+            </a:pPr>
+            <a:r>
+              <a:rPr lang="en-US" sz="3200" dirty="0"/>
+              <a:t>Full list of robot names, types, and colors</a:t>
+            </a:r>
+          </a:p>
+          <a:p>
+            <a:pPr marL="571500" indent="-571500">
+              <a:buFont typeface="Arial" panose="020B0604020202020204" pitchFamily="34" charset="0"/>
+              <a:buChar char="•"/>
+            </a:pPr>
+            <a:r>
+              <a:rPr lang="en-US" sz="3600" dirty="0"/>
+              <a:t>/shutdown</a:t>
+            </a:r>
+          </a:p>
+          <a:p>
+            <a:pPr marL="571500" indent="-571500">
+              <a:buFont typeface="Arial" panose="020B0604020202020204" pitchFamily="34" charset="0"/>
+              <a:buChar char="•"/>
+            </a:pPr>
+            <a:r>
+              <a:rPr lang="en-US" sz="3600" i="1" dirty="0"/>
+              <a:t>/</a:t>
+            </a:r>
+            <a:r>
+              <a:rPr lang="en-US" sz="3600" i="1" dirty="0" err="1"/>
+              <a:t>kinect</a:t>
+            </a:r>
+            <a:r>
+              <a:rPr lang="en-US" sz="3600" i="1" dirty="0"/>
+              <a:t>#/</a:t>
+            </a:r>
+            <a:r>
+              <a:rPr lang="en-US" sz="3600" i="1" dirty="0" err="1"/>
+              <a:t>bot_list</a:t>
+            </a:r>
+            <a:endParaRPr lang="en-US" sz="3600" i="1" dirty="0"/>
+          </a:p>
+          <a:p>
+            <a:pPr marL="1028700" lvl="1" indent="-571500">
+              <a:buFont typeface="Arial" panose="020B0604020202020204" pitchFamily="34" charset="0"/>
+              <a:buChar char="•"/>
+            </a:pPr>
+            <a:r>
+              <a:rPr lang="en-US" sz="3200" dirty="0"/>
+              <a:t>A list of robots to track</a:t>
+            </a:r>
+          </a:p>
+          <a:p>
+            <a:pPr marL="571500" indent="-571500">
+              <a:buFont typeface="Arial" panose="020B0604020202020204" pitchFamily="34" charset="0"/>
+              <a:buChar char="•"/>
+            </a:pPr>
+            <a:r>
+              <a:rPr lang="en-US" sz="3600" i="1" dirty="0"/>
+              <a:t>/</a:t>
+            </a:r>
+            <a:r>
+              <a:rPr lang="en-US" sz="3600" i="1" dirty="0" err="1"/>
+              <a:t>kinect</a:t>
+            </a:r>
+            <a:r>
+              <a:rPr lang="en-US" sz="3600" i="1" dirty="0"/>
+              <a:t>#/incoming</a:t>
+            </a:r>
+          </a:p>
+          <a:p>
+            <a:pPr marL="1028700" lvl="1" indent="-571500">
+              <a:buFont typeface="Arial" panose="020B0604020202020204" pitchFamily="34" charset="0"/>
+              <a:buChar char="•"/>
+            </a:pPr>
+            <a:r>
+              <a:rPr lang="en-US" sz="3200" dirty="0"/>
+              <a:t>A list of robots to watch the boundaries for</a:t>
+            </a:r>
+          </a:p>
+        </p:txBody>
+      </p:sp>
     </p:spTree>
     <p:extLst>
       <p:ext uri="{BB962C8B-B14F-4D97-AF65-F5344CB8AC3E}">

</xml_diff>

<commit_message>
Rearranged sections for the addition of MatLab images which will be added shortly.
</commit_message>
<xml_diff>
--- a/documentation/poster/poster.pptx
+++ b/documentation/poster/poster.pptx
@@ -247,7 +247,7 @@
           <a:p>
             <a:fld id="{00A5CD91-B80E-4D93-AA1A-3B67EAF1B994}" type="datetimeFigureOut">
               <a:rPr lang="en-US" smtClean="0"/>
-              <a:t>7/22/2017</a:t>
+              <a:t>7/24/2017</a:t>
             </a:fld>
             <a:endParaRPr lang="en-US"/>
           </a:p>
@@ -417,7 +417,7 @@
           <a:p>
             <a:fld id="{00A5CD91-B80E-4D93-AA1A-3B67EAF1B994}" type="datetimeFigureOut">
               <a:rPr lang="en-US" smtClean="0"/>
-              <a:t>7/22/2017</a:t>
+              <a:t>7/24/2017</a:t>
             </a:fld>
             <a:endParaRPr lang="en-US"/>
           </a:p>
@@ -597,7 +597,7 @@
           <a:p>
             <a:fld id="{00A5CD91-B80E-4D93-AA1A-3B67EAF1B994}" type="datetimeFigureOut">
               <a:rPr lang="en-US" smtClean="0"/>
-              <a:t>7/22/2017</a:t>
+              <a:t>7/24/2017</a:t>
             </a:fld>
             <a:endParaRPr lang="en-US"/>
           </a:p>
@@ -767,7 +767,7 @@
           <a:p>
             <a:fld id="{00A5CD91-B80E-4D93-AA1A-3B67EAF1B994}" type="datetimeFigureOut">
               <a:rPr lang="en-US" smtClean="0"/>
-              <a:t>7/22/2017</a:t>
+              <a:t>7/24/2017</a:t>
             </a:fld>
             <a:endParaRPr lang="en-US"/>
           </a:p>
@@ -1011,7 +1011,7 @@
           <a:p>
             <a:fld id="{00A5CD91-B80E-4D93-AA1A-3B67EAF1B994}" type="datetimeFigureOut">
               <a:rPr lang="en-US" smtClean="0"/>
-              <a:t>7/22/2017</a:t>
+              <a:t>7/24/2017</a:t>
             </a:fld>
             <a:endParaRPr lang="en-US"/>
           </a:p>
@@ -1243,7 +1243,7 @@
           <a:p>
             <a:fld id="{00A5CD91-B80E-4D93-AA1A-3B67EAF1B994}" type="datetimeFigureOut">
               <a:rPr lang="en-US" smtClean="0"/>
-              <a:t>7/22/2017</a:t>
+              <a:t>7/24/2017</a:t>
             </a:fld>
             <a:endParaRPr lang="en-US"/>
           </a:p>
@@ -1610,7 +1610,7 @@
           <a:p>
             <a:fld id="{00A5CD91-B80E-4D93-AA1A-3B67EAF1B994}" type="datetimeFigureOut">
               <a:rPr lang="en-US" smtClean="0"/>
-              <a:t>7/22/2017</a:t>
+              <a:t>7/24/2017</a:t>
             </a:fld>
             <a:endParaRPr lang="en-US"/>
           </a:p>
@@ -1728,7 +1728,7 @@
           <a:p>
             <a:fld id="{00A5CD91-B80E-4D93-AA1A-3B67EAF1B994}" type="datetimeFigureOut">
               <a:rPr lang="en-US" smtClean="0"/>
-              <a:t>7/22/2017</a:t>
+              <a:t>7/24/2017</a:t>
             </a:fld>
             <a:endParaRPr lang="en-US"/>
           </a:p>
@@ -1823,7 +1823,7 @@
           <a:p>
             <a:fld id="{00A5CD91-B80E-4D93-AA1A-3B67EAF1B994}" type="datetimeFigureOut">
               <a:rPr lang="en-US" smtClean="0"/>
-              <a:t>7/22/2017</a:t>
+              <a:t>7/24/2017</a:t>
             </a:fld>
             <a:endParaRPr lang="en-US"/>
           </a:p>
@@ -2100,7 +2100,7 @@
           <a:p>
             <a:fld id="{00A5CD91-B80E-4D93-AA1A-3B67EAF1B994}" type="datetimeFigureOut">
               <a:rPr lang="en-US" smtClean="0"/>
-              <a:t>7/22/2017</a:t>
+              <a:t>7/24/2017</a:t>
             </a:fld>
             <a:endParaRPr lang="en-US"/>
           </a:p>
@@ -2357,7 +2357,7 @@
           <a:p>
             <a:fld id="{00A5CD91-B80E-4D93-AA1A-3B67EAF1B994}" type="datetimeFigureOut">
               <a:rPr lang="en-US" smtClean="0"/>
-              <a:t>7/22/2017</a:t>
+              <a:t>7/24/2017</a:t>
             </a:fld>
             <a:endParaRPr lang="en-US"/>
           </a:p>
@@ -2570,7 +2570,7 @@
           <a:p>
             <a:fld id="{00A5CD91-B80E-4D93-AA1A-3B67EAF1B994}" type="datetimeFigureOut">
               <a:rPr lang="en-US" smtClean="0"/>
-              <a:t>7/22/2017</a:t>
+              <a:t>7/24/2017</a:t>
             </a:fld>
             <a:endParaRPr lang="en-US"/>
           </a:p>
@@ -3101,7 +3101,7 @@
         </p:nvSpPr>
         <p:spPr>
           <a:xfrm>
-            <a:off x="20069878" y="18042312"/>
+            <a:off x="20123698" y="21774556"/>
             <a:ext cx="8425733" cy="1815882"/>
           </a:xfrm>
           <a:prstGeom prst="rect">
@@ -3206,7 +3206,7 @@
         </p:nvSpPr>
         <p:spPr>
           <a:xfrm>
-            <a:off x="20069880" y="12389752"/>
+            <a:off x="20123698" y="16568675"/>
             <a:ext cx="8425733" cy="3477875"/>
           </a:xfrm>
           <a:prstGeom prst="rect">
@@ -3382,7 +3382,7 @@
         </p:nvSpPr>
         <p:spPr>
           <a:xfrm>
-            <a:off x="20069879" y="15867627"/>
+            <a:off x="20123698" y="20117840"/>
             <a:ext cx="8425733" cy="1261884"/>
           </a:xfrm>
           <a:prstGeom prst="rect">
@@ -3681,7 +3681,7 @@
         </p:nvGrpSpPr>
         <p:grpSpPr>
           <a:xfrm>
-            <a:off x="20069880" y="4489817"/>
+            <a:off x="20123700" y="8928741"/>
             <a:ext cx="9064911" cy="7532768"/>
             <a:chOff x="11250406" y="15085839"/>
             <a:chExt cx="9064911" cy="7532768"/>
@@ -3866,7 +3866,7 @@
         </p:nvSpPr>
         <p:spPr>
           <a:xfrm>
-            <a:off x="11176745" y="18777542"/>
+            <a:off x="20287692" y="4465981"/>
             <a:ext cx="8425733" cy="4462760"/>
           </a:xfrm>
           <a:prstGeom prst="rect">

</xml_diff>

<commit_message>
More changes were made to existing layout of the poster.
</commit_message>
<xml_diff>
--- a/documentation/poster/poster.pptx
+++ b/documentation/poster/poster.pptx
@@ -3143,7 +3143,7 @@
         </p:nvSpPr>
         <p:spPr>
           <a:xfrm>
-            <a:off x="11176751" y="4660328"/>
+            <a:off x="11117767" y="9062207"/>
             <a:ext cx="8896469" cy="5139869"/>
           </a:xfrm>
           <a:prstGeom prst="rect">
@@ -3591,7 +3591,7 @@
         </p:nvGrpSpPr>
         <p:grpSpPr>
           <a:xfrm>
-            <a:off x="11067287" y="13703271"/>
+            <a:off x="11008303" y="18105150"/>
             <a:ext cx="9115395" cy="4851623"/>
             <a:chOff x="11176745" y="9833440"/>
             <a:chExt cx="9115395" cy="4851623"/>
@@ -3771,7 +3771,7 @@
         </p:nvSpPr>
         <p:spPr>
           <a:xfrm>
-            <a:off x="11176745" y="9756032"/>
+            <a:off x="11117761" y="14157911"/>
             <a:ext cx="8425733" cy="3785652"/>
           </a:xfrm>
           <a:prstGeom prst="rect">

</xml_diff>

<commit_message>
Added new image to poster and updated references. Need to finish references.
</commit_message>
<xml_diff>
--- a/documentation/poster/poster.pptx
+++ b/documentation/poster/poster.pptx
@@ -3101,8 +3101,8 @@
         </p:nvSpPr>
         <p:spPr>
           <a:xfrm>
-            <a:off x="20123698" y="21774556"/>
-            <a:ext cx="8425733" cy="1815882"/>
+            <a:off x="20287690" y="20927429"/>
+            <a:ext cx="8425733" cy="2800767"/>
           </a:xfrm>
           <a:prstGeom prst="rect">
             <a:avLst/>
@@ -3126,9 +3126,45 @@
           </a:p>
           <a:p>
             <a:r>
-              <a:rPr lang="en-US" sz="3600" dirty="0"/>
-              <a:t>Nathan’s Thesis</a:t>
-            </a:r>
+              <a:rPr lang="en-US" sz="2000" dirty="0" smtClean="0"/>
+              <a:t>[1] </a:t>
+            </a:r>
+            <a:r>
+              <a:rPr lang="en-US" sz="2000" dirty="0" err="1" smtClean="0"/>
+              <a:t>Okane</a:t>
+            </a:r>
+            <a:endParaRPr lang="en-US" sz="2000" dirty="0" smtClean="0"/>
+          </a:p>
+          <a:p>
+            <a:r>
+              <a:rPr lang="en-US" sz="2000" dirty="0" smtClean="0"/>
+              <a:t>[2] N. Hervey, “Localization and Control of Distributed Mobile Robots with the Microsoft Kinect and StarL”, April 2016</a:t>
+            </a:r>
+          </a:p>
+          <a:p>
+            <a:r>
+              <a:rPr lang="en-US" sz="2000" dirty="0" smtClean="0"/>
+              <a:t>[3] </a:t>
+            </a:r>
+            <a:r>
+              <a:rPr lang="en-US" sz="2000" dirty="0" err="1" smtClean="0"/>
+              <a:t>Rado</a:t>
+            </a:r>
+            <a:r>
+              <a:rPr lang="en-US" sz="2000" dirty="0" smtClean="0"/>
+              <a:t> </a:t>
+            </a:r>
+          </a:p>
+          <a:p>
+            <a:r>
+              <a:rPr lang="en-US" sz="2000" dirty="0" smtClean="0"/>
+              <a:t>[4] </a:t>
+            </a:r>
+            <a:r>
+              <a:rPr lang="en-US" sz="2000" dirty="0" err="1" smtClean="0"/>
+              <a:t>Swarnava</a:t>
+            </a:r>
+            <a:endParaRPr lang="en-US" sz="2000" dirty="0"/>
           </a:p>
           <a:p>
             <a:endParaRPr lang="en-US" sz="3600" dirty="0"/>
@@ -3143,8 +3179,8 @@
         </p:nvSpPr>
         <p:spPr>
           <a:xfrm>
-            <a:off x="11117767" y="9062207"/>
-            <a:ext cx="8896469" cy="5139869"/>
+            <a:off x="11117761" y="8794762"/>
+            <a:ext cx="8896469" cy="6247864"/>
           </a:xfrm>
           <a:prstGeom prst="rect">
             <a:avLst/>
@@ -3167,13 +3203,36 @@
             </a:r>
           </a:p>
           <a:p>
+            <a:r>
+              <a:rPr lang="en-US" sz="3600" dirty="0" smtClean="0"/>
+              <a:t>StarL and examples are available at: </a:t>
+            </a:r>
+            <a:r>
+              <a:rPr lang="en-US" sz="3600" i="1" dirty="0">
+                <a:solidFill>
+                  <a:schemeClr val="tx2"/>
+                </a:solidFill>
+              </a:rPr>
+              <a:t>https://github.com/verivital/starl</a:t>
+            </a:r>
+            <a:endParaRPr lang="en-US" sz="3600" i="1" dirty="0" smtClean="0">
+              <a:solidFill>
+                <a:schemeClr val="tx2"/>
+              </a:solidFill>
+            </a:endParaRPr>
+          </a:p>
+          <a:p>
             <a:pPr marL="571500" indent="-571500">
               <a:buFont typeface="Arial" panose="020B0604020202020204" pitchFamily="34" charset="0"/>
               <a:buChar char="•"/>
             </a:pPr>
             <a:r>
+              <a:rPr lang="en-US" sz="3600" dirty="0" smtClean="0"/>
+              <a:t>2 </a:t>
+            </a:r>
+            <a:r>
               <a:rPr lang="en-US" sz="3600" dirty="0"/>
-              <a:t>2 types of ROS nodes: Central Command, and Robot Observer</a:t>
+              <a:t>types of ROS nodes: Central Command, and Robot Observer</a:t>
             </a:r>
           </a:p>
           <a:p>
@@ -3206,7 +3265,7 @@
         </p:nvSpPr>
         <p:spPr>
           <a:xfrm>
-            <a:off x="20123698" y="16568675"/>
+            <a:off x="20287692" y="16252389"/>
             <a:ext cx="8425733" cy="3477875"/>
           </a:xfrm>
           <a:prstGeom prst="rect">
@@ -3382,7 +3441,7 @@
         </p:nvSpPr>
         <p:spPr>
           <a:xfrm>
-            <a:off x="20123698" y="20117840"/>
+            <a:off x="20287691" y="19665545"/>
             <a:ext cx="8425733" cy="1261884"/>
           </a:xfrm>
           <a:prstGeom prst="rect">
@@ -3591,7 +3650,7 @@
         </p:nvGrpSpPr>
         <p:grpSpPr>
           <a:xfrm>
-            <a:off x="11008303" y="18105150"/>
+            <a:off x="11008303" y="18561390"/>
             <a:ext cx="9115395" cy="4851623"/>
             <a:chOff x="11176745" y="9833440"/>
             <a:chExt cx="9115395" cy="4851623"/>
@@ -3681,7 +3740,7 @@
         </p:nvGrpSpPr>
         <p:grpSpPr>
           <a:xfrm>
-            <a:off x="20123700" y="8928741"/>
+            <a:off x="20287692" y="8719621"/>
             <a:ext cx="9064911" cy="7532768"/>
             <a:chOff x="11250406" y="15085839"/>
             <a:chExt cx="9064911" cy="7532768"/>
@@ -3771,7 +3830,7 @@
         </p:nvSpPr>
         <p:spPr>
           <a:xfrm>
-            <a:off x="11117761" y="14157911"/>
+            <a:off x="11117760" y="14909182"/>
             <a:ext cx="8425733" cy="3785652"/>
           </a:xfrm>
           <a:prstGeom prst="rect">
@@ -3984,6 +4043,80 @@
               <a:rPr lang="en-US" sz="3200" dirty="0"/>
               <a:t>A list of robots to watch the boundaries for</a:t>
             </a:r>
+          </a:p>
+        </p:txBody>
+      </p:sp>
+      <p:pic>
+        <p:nvPicPr>
+          <p:cNvPr id="3" name="Picture 2"/>
+          <p:cNvPicPr>
+            <a:picLocks noChangeAspect="1"/>
+          </p:cNvPicPr>
+          <p:nvPr/>
+        </p:nvPicPr>
+        <p:blipFill>
+          <a:blip r:embed="rId8">
+            <a:extLst>
+              <a:ext uri="{28A0092B-C50C-407E-A947-70E740481C1C}">
+                <a14:useLocalDpi xmlns:a14="http://schemas.microsoft.com/office/drawing/2010/main" val="0"/>
+              </a:ext>
+            </a:extLst>
+          </a:blip>
+          <a:stretch>
+            <a:fillRect/>
+          </a:stretch>
+        </p:blipFill>
+        <p:spPr>
+          <a:xfrm>
+            <a:off x="12663627" y="5055782"/>
+            <a:ext cx="5334000" cy="4000500"/>
+          </a:xfrm>
+          <a:prstGeom prst="rect">
+            <a:avLst/>
+          </a:prstGeom>
+        </p:spPr>
+      </p:pic>
+      <p:sp>
+        <p:nvSpPr>
+          <p:cNvPr id="27" name="TextBox 26"/>
+          <p:cNvSpPr txBox="1"/>
+          <p:nvPr/>
+        </p:nvSpPr>
+        <p:spPr>
+          <a:xfrm>
+            <a:off x="11117761" y="4563290"/>
+            <a:ext cx="8425733" cy="1815882"/>
+          </a:xfrm>
+          <a:prstGeom prst="rect">
+            <a:avLst/>
+          </a:prstGeom>
+          <a:noFill/>
+        </p:spPr>
+        <p:txBody>
+          <a:bodyPr wrap="square" rtlCol="0">
+            <a:spAutoFit/>
+          </a:bodyPr>
+          <a:lstStyle/>
+          <a:p>
+            <a:r>
+              <a:rPr lang="en-US" sz="4000" b="1" dirty="0" smtClean="0">
+                <a:solidFill>
+                  <a:schemeClr val="tx2"/>
+                </a:solidFill>
+              </a:rPr>
+              <a:t>Localization Example</a:t>
+            </a:r>
+            <a:endParaRPr lang="en-US" sz="4000" b="1" dirty="0">
+              <a:solidFill>
+                <a:schemeClr val="tx2"/>
+              </a:solidFill>
+            </a:endParaRPr>
+          </a:p>
+          <a:p>
+            <a:endParaRPr lang="en-US" sz="3600" dirty="0"/>
+          </a:p>
+          <a:p>
+            <a:endParaRPr lang="en-US" sz="3600" dirty="0"/>
           </a:p>
         </p:txBody>
       </p:sp>

</xml_diff>

<commit_message>
References have been updated in the poster.
</commit_message>
<xml_diff>
--- a/documentation/poster/poster.pptx
+++ b/documentation/poster/poster.pptx
@@ -3102,7 +3102,7 @@
         <p:spPr>
           <a:xfrm>
             <a:off x="20287690" y="20927429"/>
-            <a:ext cx="8425733" cy="2800767"/>
+            <a:ext cx="8425733" cy="1938992"/>
           </a:xfrm>
           <a:prstGeom prst="rect">
             <a:avLst/>
@@ -3126,48 +3126,36 @@
           </a:p>
           <a:p>
             <a:r>
-              <a:rPr lang="en-US" sz="2000" dirty="0" smtClean="0"/>
-              <a:t>[1] </a:t>
-            </a:r>
-            <a:r>
-              <a:rPr lang="en-US" sz="2000" dirty="0" err="1" smtClean="0"/>
-              <a:t>Okane</a:t>
-            </a:r>
-            <a:endParaRPr lang="en-US" sz="2000" dirty="0" smtClean="0"/>
-          </a:p>
-          <a:p>
-            <a:r>
-              <a:rPr lang="en-US" sz="2000" dirty="0" smtClean="0"/>
-              <a:t>[2] N. Hervey, “Localization and Control of Distributed Mobile Robots with the Microsoft Kinect and StarL”, April 2016</a:t>
-            </a:r>
-          </a:p>
-          <a:p>
-            <a:r>
-              <a:rPr lang="en-US" sz="2000" dirty="0" smtClean="0"/>
-              <a:t>[3] </a:t>
-            </a:r>
-            <a:r>
-              <a:rPr lang="en-US" sz="2000" dirty="0" err="1" smtClean="0"/>
-              <a:t>Rado</a:t>
-            </a:r>
-            <a:r>
-              <a:rPr lang="en-US" sz="2000" dirty="0" smtClean="0"/>
-              <a:t> </a:t>
-            </a:r>
-          </a:p>
-          <a:p>
-            <a:r>
-              <a:rPr lang="en-US" sz="2000" dirty="0" smtClean="0"/>
-              <a:t>[4] </a:t>
-            </a:r>
-            <a:r>
-              <a:rPr lang="en-US" sz="2000" dirty="0" err="1" smtClean="0"/>
-              <a:t>Swarnava</a:t>
+              <a:rPr lang="en-US" sz="2000" dirty="0"/>
+              <a:t>[1] J. M. O’Kane, A Gentle Introduction to ROS. Independently published, Oct. 2013, available at http://www.cse.sc.edu/∼</a:t>
+            </a:r>
+            <a:r>
+              <a:rPr lang="en-US" sz="2000" dirty="0" err="1"/>
+              <a:t>jokane</a:t>
+            </a:r>
+            <a:r>
+              <a:rPr lang="en-US" sz="2000" dirty="0"/>
+              <a:t>/</a:t>
+            </a:r>
+            <a:r>
+              <a:rPr lang="en-US" sz="2000" dirty="0" err="1"/>
+              <a:t>agitr</a:t>
+            </a:r>
+            <a:r>
+              <a:rPr lang="en-US" sz="2000" dirty="0"/>
+              <a:t>/.</a:t>
+            </a:r>
+          </a:p>
+          <a:p>
+            <a:r>
+              <a:rPr lang="en-US" sz="2000" dirty="0"/>
+              <a:t>[2] N. Hervey, “Localization and Control of Distributed Mobile Robots with the Microsoft Kinect and StarL”, </a:t>
+            </a:r>
+            <a:r>
+              <a:rPr lang="en-US" sz="2000"/>
+              <a:t>April 2016</a:t>
             </a:r>
             <a:endParaRPr lang="en-US" sz="2000" dirty="0"/>
-          </a:p>
-          <a:p>
-            <a:endParaRPr lang="en-US" sz="3600" dirty="0"/>
           </a:p>
         </p:txBody>
       </p:sp>
@@ -3204,7 +3192,7 @@
           </a:p>
           <a:p>
             <a:r>
-              <a:rPr lang="en-US" sz="3600" dirty="0" smtClean="0"/>
+              <a:rPr lang="en-US" sz="3600" dirty="0"/>
               <a:t>StarL and examples are available at: </a:t>
             </a:r>
             <a:r>
@@ -3215,11 +3203,6 @@
               </a:rPr>
               <a:t>https://github.com/verivital/starl</a:t>
             </a:r>
-            <a:endParaRPr lang="en-US" sz="3600" i="1" dirty="0" smtClean="0">
-              <a:solidFill>
-                <a:schemeClr val="tx2"/>
-              </a:solidFill>
-            </a:endParaRPr>
           </a:p>
           <a:p>
             <a:pPr marL="571500" indent="-571500">
@@ -3227,12 +3210,8 @@
               <a:buChar char="•"/>
             </a:pPr>
             <a:r>
-              <a:rPr lang="en-US" sz="3600" dirty="0" smtClean="0"/>
-              <a:t>2 </a:t>
-            </a:r>
-            <a:r>
               <a:rPr lang="en-US" sz="3600" dirty="0"/>
-              <a:t>types of ROS nodes: Central Command, and Robot Observer</a:t>
+              <a:t>2 types of ROS nodes: Central Command, and Robot Observer</a:t>
             </a:r>
           </a:p>
           <a:p>
@@ -4099,18 +4078,13 @@
           <a:lstStyle/>
           <a:p>
             <a:r>
-              <a:rPr lang="en-US" sz="4000" b="1" dirty="0" smtClean="0">
+              <a:rPr lang="en-US" sz="4000" b="1" dirty="0">
                 <a:solidFill>
                   <a:schemeClr val="tx2"/>
                 </a:solidFill>
               </a:rPr>
               <a:t>Localization Example</a:t>
             </a:r>
-            <a:endParaRPr lang="en-US" sz="4000" b="1" dirty="0">
-              <a:solidFill>
-                <a:schemeClr val="tx2"/>
-              </a:solidFill>
-            </a:endParaRPr>
           </a:p>
           <a:p>
             <a:endParaRPr lang="en-US" sz="3600" dirty="0"/>

</xml_diff>